<commit_message>
reran and saved outputs
</commit_message>
<xml_diff>
--- a/architecture diagrams/diagrams.pptx
+++ b/architecture diagrams/diagrams.pptx
@@ -5,13 +5,14 @@
     <p:sldMasterId id="2147483648" r:id="rId1"/>
   </p:sldMasterIdLst>
   <p:sldIdLst>
-    <p:sldId id="256" r:id="rId2"/>
-    <p:sldId id="257" r:id="rId3"/>
-    <p:sldId id="262" r:id="rId4"/>
-    <p:sldId id="258" r:id="rId5"/>
-    <p:sldId id="259" r:id="rId6"/>
-    <p:sldId id="260" r:id="rId7"/>
-    <p:sldId id="261" r:id="rId8"/>
+    <p:sldId id="263" r:id="rId2"/>
+    <p:sldId id="256" r:id="rId3"/>
+    <p:sldId id="257" r:id="rId4"/>
+    <p:sldId id="262" r:id="rId5"/>
+    <p:sldId id="258" r:id="rId6"/>
+    <p:sldId id="259" r:id="rId7"/>
+    <p:sldId id="260" r:id="rId8"/>
+    <p:sldId id="261" r:id="rId9"/>
   </p:sldIdLst>
   <p:sldSz cx="12192000" cy="6858000"/>
   <p:notesSz cx="6858000" cy="9144000"/>
@@ -110,6 +111,11 @@
       </a:defRPr>
     </a:lvl9pPr>
   </p:defaultTextStyle>
+  <p:extLst>
+    <p:ext uri="{EFAFB233-063F-42B5-8137-9DF3F51BA10A}">
+      <p15:sldGuideLst xmlns:p15="http://schemas.microsoft.com/office/powerpoint/2012/main"/>
+    </p:ext>
+  </p:extLst>
 </p:presentation>
 </file>
 
@@ -260,7 +266,7 @@
           <a:p>
             <a:fld id="{63E81274-8733-4E52-A051-43C63AD3EC38}" type="datetimeFigureOut">
               <a:rPr lang="en-US" smtClean="0"/>
-              <a:t>10/21/2025</a:t>
+              <a:t>11/4/2025</a:t>
             </a:fld>
             <a:endParaRPr lang="en-US"/>
           </a:p>
@@ -458,7 +464,7 @@
           <a:p>
             <a:fld id="{63E81274-8733-4E52-A051-43C63AD3EC38}" type="datetimeFigureOut">
               <a:rPr lang="en-US" smtClean="0"/>
-              <a:t>10/21/2025</a:t>
+              <a:t>11/4/2025</a:t>
             </a:fld>
             <a:endParaRPr lang="en-US"/>
           </a:p>
@@ -666,7 +672,7 @@
           <a:p>
             <a:fld id="{63E81274-8733-4E52-A051-43C63AD3EC38}" type="datetimeFigureOut">
               <a:rPr lang="en-US" smtClean="0"/>
-              <a:t>10/21/2025</a:t>
+              <a:t>11/4/2025</a:t>
             </a:fld>
             <a:endParaRPr lang="en-US"/>
           </a:p>
@@ -864,7 +870,7 @@
           <a:p>
             <a:fld id="{63E81274-8733-4E52-A051-43C63AD3EC38}" type="datetimeFigureOut">
               <a:rPr lang="en-US" smtClean="0"/>
-              <a:t>10/21/2025</a:t>
+              <a:t>11/4/2025</a:t>
             </a:fld>
             <a:endParaRPr lang="en-US"/>
           </a:p>
@@ -1139,7 +1145,7 @@
           <a:p>
             <a:fld id="{63E81274-8733-4E52-A051-43C63AD3EC38}" type="datetimeFigureOut">
               <a:rPr lang="en-US" smtClean="0"/>
-              <a:t>10/21/2025</a:t>
+              <a:t>11/4/2025</a:t>
             </a:fld>
             <a:endParaRPr lang="en-US"/>
           </a:p>
@@ -1404,7 +1410,7 @@
           <a:p>
             <a:fld id="{63E81274-8733-4E52-A051-43C63AD3EC38}" type="datetimeFigureOut">
               <a:rPr lang="en-US" smtClean="0"/>
-              <a:t>10/21/2025</a:t>
+              <a:t>11/4/2025</a:t>
             </a:fld>
             <a:endParaRPr lang="en-US"/>
           </a:p>
@@ -1816,7 +1822,7 @@
           <a:p>
             <a:fld id="{63E81274-8733-4E52-A051-43C63AD3EC38}" type="datetimeFigureOut">
               <a:rPr lang="en-US" smtClean="0"/>
-              <a:t>10/21/2025</a:t>
+              <a:t>11/4/2025</a:t>
             </a:fld>
             <a:endParaRPr lang="en-US"/>
           </a:p>
@@ -1957,7 +1963,7 @@
           <a:p>
             <a:fld id="{63E81274-8733-4E52-A051-43C63AD3EC38}" type="datetimeFigureOut">
               <a:rPr lang="en-US" smtClean="0"/>
-              <a:t>10/21/2025</a:t>
+              <a:t>11/4/2025</a:t>
             </a:fld>
             <a:endParaRPr lang="en-US"/>
           </a:p>
@@ -2070,7 +2076,7 @@
           <a:p>
             <a:fld id="{63E81274-8733-4E52-A051-43C63AD3EC38}" type="datetimeFigureOut">
               <a:rPr lang="en-US" smtClean="0"/>
-              <a:t>10/21/2025</a:t>
+              <a:t>11/4/2025</a:t>
             </a:fld>
             <a:endParaRPr lang="en-US"/>
           </a:p>
@@ -2381,7 +2387,7 @@
           <a:p>
             <a:fld id="{63E81274-8733-4E52-A051-43C63AD3EC38}" type="datetimeFigureOut">
               <a:rPr lang="en-US" smtClean="0"/>
-              <a:t>10/21/2025</a:t>
+              <a:t>11/4/2025</a:t>
             </a:fld>
             <a:endParaRPr lang="en-US"/>
           </a:p>
@@ -2669,7 +2675,7 @@
           <a:p>
             <a:fld id="{63E81274-8733-4E52-A051-43C63AD3EC38}" type="datetimeFigureOut">
               <a:rPr lang="en-US" smtClean="0"/>
-              <a:t>10/21/2025</a:t>
+              <a:t>11/4/2025</a:t>
             </a:fld>
             <a:endParaRPr lang="en-US"/>
           </a:p>
@@ -2910,7 +2916,7 @@
           <a:p>
             <a:fld id="{63E81274-8733-4E52-A051-43C63AD3EC38}" type="datetimeFigureOut">
               <a:rPr lang="en-US" smtClean="0"/>
-              <a:t>10/21/2025</a:t>
+              <a:t>11/4/2025</a:t>
             </a:fld>
             <a:endParaRPr lang="en-US"/>
           </a:p>
@@ -3315,6 +3321,836 @@
   <p:cSld>
     <p:spTree>
       <p:nvGrpSpPr>
+        <p:cNvPr id="1" name="">
+          <a:extLst>
+            <a:ext uri="{FF2B5EF4-FFF2-40B4-BE49-F238E27FC236}">
+              <a16:creationId xmlns:a16="http://schemas.microsoft.com/office/drawing/2014/main" id="{4C9650ED-4D67-397B-A5EB-5D61D1646728}"/>
+            </a:ext>
+          </a:extLst>
+        </p:cNvPr>
+        <p:cNvGrpSpPr/>
+        <p:nvPr/>
+      </p:nvGrpSpPr>
+      <p:grpSpPr>
+        <a:xfrm>
+          <a:off x="0" y="0"/>
+          <a:ext cx="0" cy="0"/>
+          <a:chOff x="0" y="0"/>
+          <a:chExt cx="0" cy="0"/>
+        </a:xfrm>
+      </p:grpSpPr>
+      <p:grpSp>
+        <p:nvGrpSpPr>
+          <p:cNvPr id="10" name="Group 9">
+            <a:extLst>
+              <a:ext uri="{FF2B5EF4-FFF2-40B4-BE49-F238E27FC236}">
+                <a16:creationId xmlns:a16="http://schemas.microsoft.com/office/drawing/2014/main" id="{CE6C9A12-CC6F-5AC1-2DCE-1C445CB1DC4B}"/>
+              </a:ext>
+            </a:extLst>
+          </p:cNvPr>
+          <p:cNvGrpSpPr/>
+          <p:nvPr/>
+        </p:nvGrpSpPr>
+        <p:grpSpPr>
+          <a:xfrm>
+            <a:off x="1271762" y="2281579"/>
+            <a:ext cx="8452087" cy="720761"/>
+            <a:chOff x="1271762" y="2281579"/>
+            <a:chExt cx="8452087" cy="720761"/>
+          </a:xfrm>
+        </p:grpSpPr>
+        <p:sp>
+          <p:nvSpPr>
+            <p:cNvPr id="52" name="TextBox 51">
+              <a:extLst>
+                <a:ext uri="{FF2B5EF4-FFF2-40B4-BE49-F238E27FC236}">
+                  <a16:creationId xmlns:a16="http://schemas.microsoft.com/office/drawing/2014/main" id="{22558C0D-E361-48A9-05FF-5E4ABCFEA775}"/>
+                </a:ext>
+              </a:extLst>
+            </p:cNvPr>
+            <p:cNvSpPr txBox="1"/>
+            <p:nvPr/>
+          </p:nvSpPr>
+          <p:spPr>
+            <a:xfrm>
+              <a:off x="3574976" y="2286357"/>
+              <a:ext cx="1607299" cy="276999"/>
+            </a:xfrm>
+            <a:prstGeom prst="rect">
+              <a:avLst/>
+            </a:prstGeom>
+            <a:noFill/>
+          </p:spPr>
+          <p:txBody>
+            <a:bodyPr wrap="square" rtlCol="0">
+              <a:spAutoFit/>
+            </a:bodyPr>
+            <a:lstStyle/>
+            <a:p>
+              <a:pPr algn="ctr"/>
+              <a:r>
+                <a:rPr lang="en-US" sz="1200" dirty="0" err="1">
+                  <a:solidFill>
+                    <a:schemeClr val="bg1">
+                      <a:lumMod val="65000"/>
+                    </a:schemeClr>
+                  </a:solidFill>
+                </a:rPr>
+                <a:t>ReLU</a:t>
+              </a:r>
+              <a:endParaRPr lang="en-US" sz="1200" dirty="0">
+                <a:solidFill>
+                  <a:schemeClr val="bg1">
+                    <a:lumMod val="65000"/>
+                  </a:schemeClr>
+                </a:solidFill>
+              </a:endParaRPr>
+            </a:p>
+          </p:txBody>
+        </p:sp>
+        <p:sp>
+          <p:nvSpPr>
+            <p:cNvPr id="53" name="Rectangle 52">
+              <a:extLst>
+                <a:ext uri="{FF2B5EF4-FFF2-40B4-BE49-F238E27FC236}">
+                  <a16:creationId xmlns:a16="http://schemas.microsoft.com/office/drawing/2014/main" id="{C7BB99BA-B118-3DAE-B1E6-7DA493F2FF45}"/>
+                </a:ext>
+              </a:extLst>
+            </p:cNvPr>
+            <p:cNvSpPr/>
+            <p:nvPr/>
+          </p:nvSpPr>
+          <p:spPr>
+            <a:xfrm>
+              <a:off x="3969009" y="2563356"/>
+              <a:ext cx="784369" cy="437734"/>
+            </a:xfrm>
+            <a:prstGeom prst="rect">
+              <a:avLst/>
+            </a:prstGeom>
+            <a:solidFill>
+              <a:schemeClr val="tx2">
+                <a:lumMod val="25000"/>
+                <a:lumOff val="75000"/>
+              </a:schemeClr>
+            </a:solidFill>
+            <a:ln>
+              <a:noFill/>
+            </a:ln>
+          </p:spPr>
+          <p:style>
+            <a:lnRef idx="2">
+              <a:schemeClr val="accent1">
+                <a:shade val="15000"/>
+              </a:schemeClr>
+            </a:lnRef>
+            <a:fillRef idx="1">
+              <a:schemeClr val="accent1"/>
+            </a:fillRef>
+            <a:effectRef idx="0">
+              <a:schemeClr val="accent1"/>
+            </a:effectRef>
+            <a:fontRef idx="minor">
+              <a:schemeClr val="lt1"/>
+            </a:fontRef>
+          </p:style>
+          <p:txBody>
+            <a:bodyPr rtlCol="0" anchor="ctr"/>
+            <a:lstStyle/>
+            <a:p>
+              <a:pPr algn="ctr"/>
+              <a:endParaRPr lang="en-US"/>
+            </a:p>
+          </p:txBody>
+        </p:sp>
+        <p:sp>
+          <p:nvSpPr>
+            <p:cNvPr id="54" name="TextBox 53">
+              <a:extLst>
+                <a:ext uri="{FF2B5EF4-FFF2-40B4-BE49-F238E27FC236}">
+                  <a16:creationId xmlns:a16="http://schemas.microsoft.com/office/drawing/2014/main" id="{A7F298EC-5829-2B4A-9FDB-C5F4C83D1878}"/>
+                </a:ext>
+              </a:extLst>
+            </p:cNvPr>
+            <p:cNvSpPr txBox="1"/>
+            <p:nvPr/>
+          </p:nvSpPr>
+          <p:spPr>
+            <a:xfrm>
+              <a:off x="4107269" y="2633277"/>
+              <a:ext cx="542713" cy="338554"/>
+            </a:xfrm>
+            <a:prstGeom prst="rect">
+              <a:avLst/>
+            </a:prstGeom>
+            <a:noFill/>
+          </p:spPr>
+          <p:txBody>
+            <a:bodyPr wrap="none" rtlCol="0">
+              <a:spAutoFit/>
+            </a:bodyPr>
+            <a:lstStyle/>
+            <a:p>
+              <a:pPr algn="ctr"/>
+              <a:r>
+                <a:rPr lang="en-US" sz="1600" dirty="0"/>
+                <a:t>FC1</a:t>
+              </a:r>
+            </a:p>
+          </p:txBody>
+        </p:sp>
+        <p:cxnSp>
+          <p:nvCxnSpPr>
+            <p:cNvPr id="55" name="Straight Arrow Connector 54">
+              <a:extLst>
+                <a:ext uri="{FF2B5EF4-FFF2-40B4-BE49-F238E27FC236}">
+                  <a16:creationId xmlns:a16="http://schemas.microsoft.com/office/drawing/2014/main" id="{B8F6CC90-8250-A60A-432B-C22EB6D4796F}"/>
+                </a:ext>
+              </a:extLst>
+            </p:cNvPr>
+            <p:cNvCxnSpPr>
+              <a:cxnSpLocks/>
+            </p:cNvCxnSpPr>
+            <p:nvPr/>
+          </p:nvCxnSpPr>
+          <p:spPr>
+            <a:xfrm>
+              <a:off x="6472626" y="2782223"/>
+              <a:ext cx="426968" cy="0"/>
+            </a:xfrm>
+            <a:prstGeom prst="straightConnector1">
+              <a:avLst/>
+            </a:prstGeom>
+            <a:ln>
+              <a:solidFill>
+                <a:schemeClr val="bg1">
+                  <a:lumMod val="75000"/>
+                </a:schemeClr>
+              </a:solidFill>
+              <a:tailEnd type="triangle"/>
+            </a:ln>
+          </p:spPr>
+          <p:style>
+            <a:lnRef idx="2">
+              <a:schemeClr val="accent1"/>
+            </a:lnRef>
+            <a:fillRef idx="0">
+              <a:schemeClr val="accent1"/>
+            </a:fillRef>
+            <a:effectRef idx="1">
+              <a:schemeClr val="accent1"/>
+            </a:effectRef>
+            <a:fontRef idx="minor">
+              <a:schemeClr val="tx1"/>
+            </a:fontRef>
+          </p:style>
+        </p:cxnSp>
+        <p:sp>
+          <p:nvSpPr>
+            <p:cNvPr id="56" name="Rectangle 55">
+              <a:extLst>
+                <a:ext uri="{FF2B5EF4-FFF2-40B4-BE49-F238E27FC236}">
+                  <a16:creationId xmlns:a16="http://schemas.microsoft.com/office/drawing/2014/main" id="{4A24CCF1-F432-2217-FBD5-A232527BFF1F}"/>
+                </a:ext>
+              </a:extLst>
+            </p:cNvPr>
+            <p:cNvSpPr/>
+            <p:nvPr/>
+          </p:nvSpPr>
+          <p:spPr>
+            <a:xfrm>
+              <a:off x="7023665" y="2564606"/>
+              <a:ext cx="784369" cy="437734"/>
+            </a:xfrm>
+            <a:prstGeom prst="rect">
+              <a:avLst/>
+            </a:prstGeom>
+            <a:solidFill>
+              <a:schemeClr val="tx2">
+                <a:lumMod val="25000"/>
+                <a:lumOff val="75000"/>
+              </a:schemeClr>
+            </a:solidFill>
+            <a:ln>
+              <a:noFill/>
+            </a:ln>
+          </p:spPr>
+          <p:style>
+            <a:lnRef idx="2">
+              <a:schemeClr val="accent1">
+                <a:shade val="15000"/>
+              </a:schemeClr>
+            </a:lnRef>
+            <a:fillRef idx="1">
+              <a:schemeClr val="accent1"/>
+            </a:fillRef>
+            <a:effectRef idx="0">
+              <a:schemeClr val="accent1"/>
+            </a:effectRef>
+            <a:fontRef idx="minor">
+              <a:schemeClr val="lt1"/>
+            </a:fontRef>
+          </p:style>
+          <p:txBody>
+            <a:bodyPr rtlCol="0" anchor="ctr"/>
+            <a:lstStyle/>
+            <a:p>
+              <a:pPr algn="ctr"/>
+              <a:endParaRPr lang="en-US"/>
+            </a:p>
+          </p:txBody>
+        </p:sp>
+        <p:sp>
+          <p:nvSpPr>
+            <p:cNvPr id="57" name="TextBox 56">
+              <a:extLst>
+                <a:ext uri="{FF2B5EF4-FFF2-40B4-BE49-F238E27FC236}">
+                  <a16:creationId xmlns:a16="http://schemas.microsoft.com/office/drawing/2014/main" id="{D84E6427-049F-8B90-0185-90C04455B896}"/>
+                </a:ext>
+              </a:extLst>
+            </p:cNvPr>
+            <p:cNvSpPr txBox="1"/>
+            <p:nvPr/>
+          </p:nvSpPr>
+          <p:spPr>
+            <a:xfrm>
+              <a:off x="7161924" y="2634527"/>
+              <a:ext cx="542714" cy="338554"/>
+            </a:xfrm>
+            <a:prstGeom prst="rect">
+              <a:avLst/>
+            </a:prstGeom>
+            <a:noFill/>
+          </p:spPr>
+          <p:txBody>
+            <a:bodyPr wrap="none" rtlCol="0">
+              <a:spAutoFit/>
+            </a:bodyPr>
+            <a:lstStyle/>
+            <a:p>
+              <a:pPr algn="ctr"/>
+              <a:r>
+                <a:rPr lang="en-US" sz="1600" dirty="0"/>
+                <a:t>FC3</a:t>
+              </a:r>
+            </a:p>
+          </p:txBody>
+        </p:sp>
+        <p:sp>
+          <p:nvSpPr>
+            <p:cNvPr id="58" name="TextBox 57">
+              <a:extLst>
+                <a:ext uri="{FF2B5EF4-FFF2-40B4-BE49-F238E27FC236}">
+                  <a16:creationId xmlns:a16="http://schemas.microsoft.com/office/drawing/2014/main" id="{D49A75C7-1CB5-A151-7E07-BFAA54BC7AE9}"/>
+                </a:ext>
+              </a:extLst>
+            </p:cNvPr>
+            <p:cNvSpPr txBox="1"/>
+            <p:nvPr/>
+          </p:nvSpPr>
+          <p:spPr>
+            <a:xfrm>
+              <a:off x="6899595" y="2281579"/>
+              <a:ext cx="1015728" cy="276999"/>
+            </a:xfrm>
+            <a:prstGeom prst="rect">
+              <a:avLst/>
+            </a:prstGeom>
+            <a:noFill/>
+          </p:spPr>
+          <p:txBody>
+            <a:bodyPr wrap="square" rtlCol="0">
+              <a:spAutoFit/>
+            </a:bodyPr>
+            <a:lstStyle/>
+            <a:p>
+              <a:pPr algn="ctr"/>
+              <a:r>
+                <a:rPr lang="en-US" sz="1200" dirty="0">
+                  <a:solidFill>
+                    <a:schemeClr val="bg1">
+                      <a:lumMod val="65000"/>
+                    </a:schemeClr>
+                  </a:solidFill>
+                </a:rPr>
+                <a:t>Output layer</a:t>
+              </a:r>
+            </a:p>
+          </p:txBody>
+        </p:sp>
+        <p:cxnSp>
+          <p:nvCxnSpPr>
+            <p:cNvPr id="59" name="Straight Arrow Connector 58">
+              <a:extLst>
+                <a:ext uri="{FF2B5EF4-FFF2-40B4-BE49-F238E27FC236}">
+                  <a16:creationId xmlns:a16="http://schemas.microsoft.com/office/drawing/2014/main" id="{6C2276BC-6FE1-4956-F6E2-FAC546D3AD7F}"/>
+                </a:ext>
+              </a:extLst>
+            </p:cNvPr>
+            <p:cNvCxnSpPr>
+              <a:cxnSpLocks/>
+            </p:cNvCxnSpPr>
+            <p:nvPr/>
+          </p:nvCxnSpPr>
+          <p:spPr>
+            <a:xfrm>
+              <a:off x="7858404" y="2782223"/>
+              <a:ext cx="444166" cy="0"/>
+            </a:xfrm>
+            <a:prstGeom prst="straightConnector1">
+              <a:avLst/>
+            </a:prstGeom>
+            <a:ln>
+              <a:solidFill>
+                <a:schemeClr val="bg1">
+                  <a:lumMod val="75000"/>
+                </a:schemeClr>
+              </a:solidFill>
+              <a:tailEnd type="triangle"/>
+            </a:ln>
+          </p:spPr>
+          <p:style>
+            <a:lnRef idx="2">
+              <a:schemeClr val="accent1"/>
+            </a:lnRef>
+            <a:fillRef idx="0">
+              <a:schemeClr val="accent1"/>
+            </a:fillRef>
+            <a:effectRef idx="1">
+              <a:schemeClr val="accent1"/>
+            </a:effectRef>
+            <a:fontRef idx="minor">
+              <a:schemeClr val="tx1"/>
+            </a:fontRef>
+          </p:style>
+        </p:cxnSp>
+        <p:sp>
+          <p:nvSpPr>
+            <p:cNvPr id="60" name="TextBox 59">
+              <a:extLst>
+                <a:ext uri="{FF2B5EF4-FFF2-40B4-BE49-F238E27FC236}">
+                  <a16:creationId xmlns:a16="http://schemas.microsoft.com/office/drawing/2014/main" id="{CC3C1B98-71D1-BB2C-FFB4-B76FE2D19B00}"/>
+                </a:ext>
+              </a:extLst>
+            </p:cNvPr>
+            <p:cNvSpPr txBox="1"/>
+            <p:nvPr/>
+          </p:nvSpPr>
+          <p:spPr>
+            <a:xfrm>
+              <a:off x="8145080" y="2593134"/>
+              <a:ext cx="1578769" cy="369332"/>
+            </a:xfrm>
+            <a:prstGeom prst="rect">
+              <a:avLst/>
+            </a:prstGeom>
+            <a:noFill/>
+          </p:spPr>
+          <p:txBody>
+            <a:bodyPr wrap="square" rtlCol="0">
+              <a:spAutoFit/>
+            </a:bodyPr>
+            <a:lstStyle/>
+            <a:p>
+              <a:pPr algn="ctr"/>
+              <a:r>
+                <a:rPr lang="en-US" dirty="0"/>
+                <a:t>Prediction</a:t>
+              </a:r>
+            </a:p>
+          </p:txBody>
+        </p:sp>
+        <p:cxnSp>
+          <p:nvCxnSpPr>
+            <p:cNvPr id="63" name="Straight Arrow Connector 62">
+              <a:extLst>
+                <a:ext uri="{FF2B5EF4-FFF2-40B4-BE49-F238E27FC236}">
+                  <a16:creationId xmlns:a16="http://schemas.microsoft.com/office/drawing/2014/main" id="{81D163B7-1F04-0200-92DA-57AB5F2DCF9C}"/>
+                </a:ext>
+              </a:extLst>
+            </p:cNvPr>
+            <p:cNvCxnSpPr>
+              <a:cxnSpLocks/>
+            </p:cNvCxnSpPr>
+            <p:nvPr/>
+          </p:nvCxnSpPr>
+          <p:spPr>
+            <a:xfrm>
+              <a:off x="3427614" y="2802554"/>
+              <a:ext cx="440256" cy="0"/>
+            </a:xfrm>
+            <a:prstGeom prst="straightConnector1">
+              <a:avLst/>
+            </a:prstGeom>
+            <a:ln>
+              <a:solidFill>
+                <a:schemeClr val="bg1">
+                  <a:lumMod val="75000"/>
+                </a:schemeClr>
+              </a:solidFill>
+              <a:tailEnd type="triangle"/>
+            </a:ln>
+          </p:spPr>
+          <p:style>
+            <a:lnRef idx="2">
+              <a:schemeClr val="accent1"/>
+            </a:lnRef>
+            <a:fillRef idx="0">
+              <a:schemeClr val="accent1"/>
+            </a:fillRef>
+            <a:effectRef idx="1">
+              <a:schemeClr val="accent1"/>
+            </a:effectRef>
+            <a:fontRef idx="minor">
+              <a:schemeClr val="tx1"/>
+            </a:fontRef>
+          </p:style>
+        </p:cxnSp>
+        <p:sp>
+          <p:nvSpPr>
+            <p:cNvPr id="2" name="TextBox 1">
+              <a:extLst>
+                <a:ext uri="{FF2B5EF4-FFF2-40B4-BE49-F238E27FC236}">
+                  <a16:creationId xmlns:a16="http://schemas.microsoft.com/office/drawing/2014/main" id="{D472F21C-99FC-6AAF-36EC-B317B367901A}"/>
+                </a:ext>
+              </a:extLst>
+            </p:cNvPr>
+            <p:cNvSpPr txBox="1"/>
+            <p:nvPr/>
+          </p:nvSpPr>
+          <p:spPr>
+            <a:xfrm>
+              <a:off x="5084872" y="2286357"/>
+              <a:ext cx="1607299" cy="276999"/>
+            </a:xfrm>
+            <a:prstGeom prst="rect">
+              <a:avLst/>
+            </a:prstGeom>
+            <a:noFill/>
+          </p:spPr>
+          <p:txBody>
+            <a:bodyPr wrap="square" rtlCol="0">
+              <a:spAutoFit/>
+            </a:bodyPr>
+            <a:lstStyle/>
+            <a:p>
+              <a:pPr algn="ctr"/>
+              <a:r>
+                <a:rPr lang="en-US" sz="1200" dirty="0">
+                  <a:solidFill>
+                    <a:schemeClr val="bg1">
+                      <a:lumMod val="65000"/>
+                    </a:schemeClr>
+                  </a:solidFill>
+                </a:rPr>
+                <a:t>GELU</a:t>
+              </a:r>
+            </a:p>
+          </p:txBody>
+        </p:sp>
+        <p:sp>
+          <p:nvSpPr>
+            <p:cNvPr id="3" name="Rectangle 2">
+              <a:extLst>
+                <a:ext uri="{FF2B5EF4-FFF2-40B4-BE49-F238E27FC236}">
+                  <a16:creationId xmlns:a16="http://schemas.microsoft.com/office/drawing/2014/main" id="{323134EE-DF08-0DF7-FA2E-AC766CB5379D}"/>
+                </a:ext>
+              </a:extLst>
+            </p:cNvPr>
+            <p:cNvSpPr/>
+            <p:nvPr/>
+          </p:nvSpPr>
+          <p:spPr>
+            <a:xfrm>
+              <a:off x="5478905" y="2563356"/>
+              <a:ext cx="784369" cy="437734"/>
+            </a:xfrm>
+            <a:prstGeom prst="rect">
+              <a:avLst/>
+            </a:prstGeom>
+            <a:solidFill>
+              <a:schemeClr val="tx2">
+                <a:lumMod val="25000"/>
+                <a:lumOff val="75000"/>
+              </a:schemeClr>
+            </a:solidFill>
+            <a:ln>
+              <a:noFill/>
+            </a:ln>
+          </p:spPr>
+          <p:style>
+            <a:lnRef idx="2">
+              <a:schemeClr val="accent1">
+                <a:shade val="15000"/>
+              </a:schemeClr>
+            </a:lnRef>
+            <a:fillRef idx="1">
+              <a:schemeClr val="accent1"/>
+            </a:fillRef>
+            <a:effectRef idx="0">
+              <a:schemeClr val="accent1"/>
+            </a:effectRef>
+            <a:fontRef idx="minor">
+              <a:schemeClr val="lt1"/>
+            </a:fontRef>
+          </p:style>
+          <p:txBody>
+            <a:bodyPr rtlCol="0" anchor="ctr"/>
+            <a:lstStyle/>
+            <a:p>
+              <a:pPr algn="ctr"/>
+              <a:endParaRPr lang="en-US"/>
+            </a:p>
+          </p:txBody>
+        </p:sp>
+        <p:sp>
+          <p:nvSpPr>
+            <p:cNvPr id="4" name="TextBox 3">
+              <a:extLst>
+                <a:ext uri="{FF2B5EF4-FFF2-40B4-BE49-F238E27FC236}">
+                  <a16:creationId xmlns:a16="http://schemas.microsoft.com/office/drawing/2014/main" id="{E9FF5727-A992-4ECD-14F0-9AF75496E10A}"/>
+                </a:ext>
+              </a:extLst>
+            </p:cNvPr>
+            <p:cNvSpPr txBox="1"/>
+            <p:nvPr/>
+          </p:nvSpPr>
+          <p:spPr>
+            <a:xfrm>
+              <a:off x="5617164" y="2633277"/>
+              <a:ext cx="542714" cy="338554"/>
+            </a:xfrm>
+            <a:prstGeom prst="rect">
+              <a:avLst/>
+            </a:prstGeom>
+            <a:noFill/>
+          </p:spPr>
+          <p:txBody>
+            <a:bodyPr wrap="none" rtlCol="0">
+              <a:spAutoFit/>
+            </a:bodyPr>
+            <a:lstStyle/>
+            <a:p>
+              <a:pPr algn="ctr"/>
+              <a:r>
+                <a:rPr lang="en-US" sz="1600" dirty="0"/>
+                <a:t>FC2</a:t>
+              </a:r>
+            </a:p>
+          </p:txBody>
+        </p:sp>
+        <p:cxnSp>
+          <p:nvCxnSpPr>
+            <p:cNvPr id="5" name="Straight Arrow Connector 4">
+              <a:extLst>
+                <a:ext uri="{FF2B5EF4-FFF2-40B4-BE49-F238E27FC236}">
+                  <a16:creationId xmlns:a16="http://schemas.microsoft.com/office/drawing/2014/main" id="{B909C780-D289-1FC0-89AC-B4F2EF110E19}"/>
+                </a:ext>
+              </a:extLst>
+            </p:cNvPr>
+            <p:cNvCxnSpPr>
+              <a:cxnSpLocks/>
+            </p:cNvCxnSpPr>
+            <p:nvPr/>
+          </p:nvCxnSpPr>
+          <p:spPr>
+            <a:xfrm>
+              <a:off x="4893994" y="2786808"/>
+              <a:ext cx="426968" cy="0"/>
+            </a:xfrm>
+            <a:prstGeom prst="straightConnector1">
+              <a:avLst/>
+            </a:prstGeom>
+            <a:ln>
+              <a:solidFill>
+                <a:schemeClr val="bg1">
+                  <a:lumMod val="75000"/>
+                </a:schemeClr>
+              </a:solidFill>
+              <a:tailEnd type="triangle"/>
+            </a:ln>
+          </p:spPr>
+          <p:style>
+            <a:lnRef idx="2">
+              <a:schemeClr val="accent1"/>
+            </a:lnRef>
+            <a:fillRef idx="0">
+              <a:schemeClr val="accent1"/>
+            </a:fillRef>
+            <a:effectRef idx="1">
+              <a:schemeClr val="accent1"/>
+            </a:effectRef>
+            <a:fontRef idx="minor">
+              <a:schemeClr val="tx1"/>
+            </a:fontRef>
+          </p:style>
+        </p:cxnSp>
+        <mc:AlternateContent xmlns:mc="http://schemas.openxmlformats.org/markup-compatibility/2006">
+          <mc:Choice xmlns:a14="http://schemas.microsoft.com/office/drawing/2010/main" Requires="a14">
+            <p:sp>
+              <p:nvSpPr>
+                <p:cNvPr id="9" name="TextBox 8">
+                  <a:extLst>
+                    <a:ext uri="{FF2B5EF4-FFF2-40B4-BE49-F238E27FC236}">
+                      <a16:creationId xmlns:a16="http://schemas.microsoft.com/office/drawing/2014/main" id="{8E964E57-B23E-BF47-D116-8E517637C5E9}"/>
+                    </a:ext>
+                  </a:extLst>
+                </p:cNvPr>
+                <p:cNvSpPr txBox="1"/>
+                <p:nvPr/>
+              </p:nvSpPr>
+              <p:spPr>
+                <a:xfrm>
+                  <a:off x="1271762" y="2664054"/>
+                  <a:ext cx="2007537" cy="276999"/>
+                </a:xfrm>
+                <a:prstGeom prst="rect">
+                  <a:avLst/>
+                </a:prstGeom>
+                <a:noFill/>
+              </p:spPr>
+              <p:txBody>
+                <a:bodyPr wrap="none" lIns="0" tIns="0" rIns="0" bIns="0" rtlCol="0">
+                  <a:spAutoFit/>
+                </a:bodyPr>
+                <a:lstStyle/>
+                <a:p>
+                  <a:r>
+                    <a:rPr lang="en-US" b="0" dirty="0"/>
+                    <a:t>(</a:t>
+                  </a:r>
+                  <a14:m>
+                    <m:oMath xmlns:m="http://schemas.openxmlformats.org/officeDocument/2006/math">
+                      <m:sSub>
+                        <m:sSubPr>
+                          <m:ctrlPr>
+                            <a:rPr lang="en-US" b="0" i="1" smtClean="0">
+                              <a:latin typeface="Cambria Math" panose="02040503050406030204" pitchFamily="18" charset="0"/>
+                            </a:rPr>
+                          </m:ctrlPr>
+                        </m:sSubPr>
+                        <m:e>
+                          <m:r>
+                            <a:rPr lang="en-US" b="0" i="1" smtClean="0">
+                              <a:latin typeface="Cambria Math" panose="02040503050406030204" pitchFamily="18" charset="0"/>
+                            </a:rPr>
+                            <m:t>𝐶</m:t>
+                          </m:r>
+                        </m:e>
+                        <m:sub>
+                          <m:r>
+                            <a:rPr lang="en-US" b="0" i="1" smtClean="0">
+                              <a:latin typeface="Cambria Math" panose="02040503050406030204" pitchFamily="18" charset="0"/>
+                            </a:rPr>
+                            <m:t>𝑡</m:t>
+                          </m:r>
+                        </m:sub>
+                      </m:sSub>
+                      <m:r>
+                        <a:rPr lang="en-US" b="0" i="1" smtClean="0">
+                          <a:latin typeface="Cambria Math" panose="02040503050406030204" pitchFamily="18" charset="0"/>
+                        </a:rPr>
+                        <m:t>, </m:t>
+                      </m:r>
+                      <m:sSub>
+                        <m:sSubPr>
+                          <m:ctrlPr>
+                            <a:rPr lang="en-US" b="0" i="1" smtClean="0">
+                              <a:latin typeface="Cambria Math" panose="02040503050406030204" pitchFamily="18" charset="0"/>
+                            </a:rPr>
+                          </m:ctrlPr>
+                        </m:sSubPr>
+                        <m:e>
+                          <m:r>
+                            <a:rPr lang="en-US" b="0" i="1" smtClean="0">
+                              <a:latin typeface="Cambria Math" panose="02040503050406030204" pitchFamily="18" charset="0"/>
+                            </a:rPr>
+                            <m:t>𝑅</m:t>
+                          </m:r>
+                        </m:e>
+                        <m:sub>
+                          <m:r>
+                            <a:rPr lang="en-US" b="0" i="1" smtClean="0">
+                              <a:latin typeface="Cambria Math" panose="02040503050406030204" pitchFamily="18" charset="0"/>
+                            </a:rPr>
+                            <m:t>𝑡</m:t>
+                          </m:r>
+                        </m:sub>
+                      </m:sSub>
+                    </m:oMath>
+                  </a14:m>
+                  <a:r>
+                    <a:rPr lang="en-US" b="0" dirty="0"/>
+                    <a:t>, static inputs)</a:t>
+                  </a:r>
+                </a:p>
+              </p:txBody>
+            </p:sp>
+          </mc:Choice>
+          <mc:Fallback>
+            <p:sp>
+              <p:nvSpPr>
+                <p:cNvPr id="9" name="TextBox 8">
+                  <a:extLst>
+                    <a:ext uri="{FF2B5EF4-FFF2-40B4-BE49-F238E27FC236}">
+                      <a16:creationId xmlns:a16="http://schemas.microsoft.com/office/drawing/2014/main" id="{8E964E57-B23E-BF47-D116-8E517637C5E9}"/>
+                    </a:ext>
+                  </a:extLst>
+                </p:cNvPr>
+                <p:cNvSpPr txBox="1">
+                  <a:spLocks noRot="1" noChangeAspect="1" noMove="1" noResize="1" noEditPoints="1" noAdjustHandles="1" noChangeArrowheads="1" noChangeShapeType="1" noTextEdit="1"/>
+                </p:cNvSpPr>
+                <p:nvPr/>
+              </p:nvSpPr>
+              <p:spPr>
+                <a:xfrm>
+                  <a:off x="1271762" y="2664054"/>
+                  <a:ext cx="2007537" cy="276999"/>
+                </a:xfrm>
+                <a:prstGeom prst="rect">
+                  <a:avLst/>
+                </a:prstGeom>
+                <a:blipFill>
+                  <a:blip r:embed="rId2"/>
+                  <a:stretch>
+                    <a:fillRect l="-7295" t="-26667" r="-6079" b="-55556"/>
+                  </a:stretch>
+                </a:blipFill>
+              </p:spPr>
+              <p:txBody>
+                <a:bodyPr/>
+                <a:lstStyle/>
+                <a:p>
+                  <a:r>
+                    <a:rPr lang="en-US">
+                      <a:noFill/>
+                    </a:rPr>
+                    <a:t> </a:t>
+                  </a:r>
+                </a:p>
+              </p:txBody>
+            </p:sp>
+          </mc:Fallback>
+        </mc:AlternateContent>
+      </p:grpSp>
+    </p:spTree>
+    <p:extLst>
+      <p:ext uri="{BB962C8B-B14F-4D97-AF65-F5344CB8AC3E}">
+        <p14:creationId xmlns:p14="http://schemas.microsoft.com/office/powerpoint/2010/main" val="753584636"/>
+      </p:ext>
+    </p:extLst>
+  </p:cSld>
+  <p:clrMapOvr>
+    <a:masterClrMapping/>
+  </p:clrMapOvr>
+</p:sld>
+</file>
+
+<file path=ppt/slides/slide2.xml><?xml version="1.0" encoding="utf-8"?>
+<p:sld xmlns:a="http://schemas.openxmlformats.org/drawingml/2006/main" xmlns:r="http://schemas.openxmlformats.org/officeDocument/2006/relationships" xmlns:p="http://schemas.openxmlformats.org/presentationml/2006/main">
+  <p:cSld>
+    <p:spTree>
+      <p:nvGrpSpPr>
         <p:cNvPr id="1" name=""/>
         <p:cNvGrpSpPr/>
         <p:nvPr/>
@@ -3347,8 +4183,8 @@
             <a:chExt cx="7322397" cy="3220988"/>
           </a:xfrm>
         </p:grpSpPr>
-        <mc:AlternateContent xmlns:mc="http://schemas.openxmlformats.org/markup-compatibility/2006">
-          <mc:Choice xmlns:a14="http://schemas.microsoft.com/office/drawing/2010/main" Requires="a14">
+        <mc:AlternateContent xmlns:mc="http://schemas.openxmlformats.org/markup-compatibility/2006" xmlns:a14="http://schemas.microsoft.com/office/drawing/2010/main">
+          <mc:Choice Requires="a14">
             <p:sp>
               <p:nvSpPr>
                 <p:cNvPr id="6" name="TextBox 5">
@@ -3377,7 +4213,6 @@
                 </a:bodyPr>
                 <a:lstStyle/>
                 <a:p>
-                  <a:pPr/>
                   <a:r>
                     <a:rPr lang="en-US" b="0" dirty="0"/>
                     <a:t>(</a:t>
@@ -3450,7 +4285,7 @@
               </p:txBody>
             </p:sp>
           </mc:Choice>
-          <mc:Fallback>
+          <mc:Fallback xmlns="">
             <p:sp>
               <p:nvSpPr>
                 <p:cNvPr id="6" name="TextBox 5">
@@ -3730,8 +4565,8 @@
             </a:fontRef>
           </p:style>
         </p:cxnSp>
-        <mc:AlternateContent xmlns:mc="http://schemas.openxmlformats.org/markup-compatibility/2006">
-          <mc:Choice xmlns:a14="http://schemas.microsoft.com/office/drawing/2010/main" Requires="a14">
+        <mc:AlternateContent xmlns:mc="http://schemas.openxmlformats.org/markup-compatibility/2006" xmlns:a14="http://schemas.microsoft.com/office/drawing/2010/main">
+          <mc:Choice Requires="a14">
             <p:sp>
               <p:nvSpPr>
                 <p:cNvPr id="16" name="TextBox 15">
@@ -3781,7 +4616,7 @@
               </p:txBody>
             </p:sp>
           </mc:Choice>
-          <mc:Fallback>
+          <mc:Fallback xmlns="">
             <p:sp>
               <p:nvSpPr>
                 <p:cNvPr id="16" name="TextBox 15">
@@ -3826,8 +4661,8 @@
             </p:sp>
           </mc:Fallback>
         </mc:AlternateContent>
-        <mc:AlternateContent xmlns:mc="http://schemas.openxmlformats.org/markup-compatibility/2006">
-          <mc:Choice xmlns:a14="http://schemas.microsoft.com/office/drawing/2010/main" Requires="a14">
+        <mc:AlternateContent xmlns:mc="http://schemas.openxmlformats.org/markup-compatibility/2006" xmlns:a14="http://schemas.microsoft.com/office/drawing/2010/main">
+          <mc:Choice Requires="a14">
             <p:sp>
               <p:nvSpPr>
                 <p:cNvPr id="20" name="TextBox 19">
@@ -3896,7 +4731,7 @@
               </p:txBody>
             </p:sp>
           </mc:Choice>
-          <mc:Fallback>
+          <mc:Fallback xmlns="">
             <p:sp>
               <p:nvSpPr>
                 <p:cNvPr id="20" name="TextBox 19">
@@ -3941,8 +4776,8 @@
             </p:sp>
           </mc:Fallback>
         </mc:AlternateContent>
-        <mc:AlternateContent xmlns:mc="http://schemas.openxmlformats.org/markup-compatibility/2006">
-          <mc:Choice xmlns:a14="http://schemas.microsoft.com/office/drawing/2010/main" Requires="a14">
+        <mc:AlternateContent xmlns:mc="http://schemas.openxmlformats.org/markup-compatibility/2006" xmlns:a14="http://schemas.microsoft.com/office/drawing/2010/main">
+          <mc:Choice Requires="a14">
             <p:sp>
               <p:nvSpPr>
                 <p:cNvPr id="23" name="TextBox 22">
@@ -3995,7 +4830,7 @@
               </p:txBody>
             </p:sp>
           </mc:Choice>
-          <mc:Fallback>
+          <mc:Fallback xmlns="">
             <p:sp>
               <p:nvSpPr>
                 <p:cNvPr id="23" name="TextBox 22">
@@ -4727,7 +5562,7 @@
 </p:sld>
 </file>
 
-<file path=ppt/slides/slide2.xml><?xml version="1.0" encoding="utf-8"?>
+<file path=ppt/slides/slide3.xml><?xml version="1.0" encoding="utf-8"?>
 <p:sld xmlns:a="http://schemas.openxmlformats.org/drawingml/2006/main" xmlns:r="http://schemas.openxmlformats.org/officeDocument/2006/relationships" xmlns:p="http://schemas.openxmlformats.org/presentationml/2006/main">
   <p:cSld>
     <p:spTree>
@@ -4764,8 +5599,8 @@
             <a:chExt cx="8003944" cy="4815603"/>
           </a:xfrm>
         </p:grpSpPr>
-        <mc:AlternateContent xmlns:mc="http://schemas.openxmlformats.org/markup-compatibility/2006">
-          <mc:Choice xmlns:a14="http://schemas.microsoft.com/office/drawing/2010/main" Requires="a14">
+        <mc:AlternateContent xmlns:mc="http://schemas.openxmlformats.org/markup-compatibility/2006" xmlns:a14="http://schemas.microsoft.com/office/drawing/2010/main">
+          <mc:Choice Requires="a14">
             <p:sp>
               <p:nvSpPr>
                 <p:cNvPr id="5" name="TextBox 4">
@@ -4794,7 +5629,6 @@
                 </a:bodyPr>
                 <a:lstStyle/>
                 <a:p>
-                  <a:pPr/>
                   <a:r>
                     <a:rPr lang="en-US" b="0" dirty="0"/>
                     <a:t>(</a:t>
@@ -4867,7 +5701,7 @@
               </p:txBody>
             </p:sp>
           </mc:Choice>
-          <mc:Fallback>
+          <mc:Fallback xmlns="">
             <p:sp>
               <p:nvSpPr>
                 <p:cNvPr id="5" name="TextBox 4">
@@ -5099,8 +5933,8 @@
             </a:fontRef>
           </p:style>
         </p:cxnSp>
-        <mc:AlternateContent xmlns:mc="http://schemas.openxmlformats.org/markup-compatibility/2006">
-          <mc:Choice xmlns:a14="http://schemas.microsoft.com/office/drawing/2010/main" Requires="a14">
+        <mc:AlternateContent xmlns:mc="http://schemas.openxmlformats.org/markup-compatibility/2006" xmlns:a14="http://schemas.microsoft.com/office/drawing/2010/main">
+          <mc:Choice Requires="a14">
             <p:sp>
               <p:nvSpPr>
                 <p:cNvPr id="11" name="TextBox 10">
@@ -5150,7 +5984,7 @@
               </p:txBody>
             </p:sp>
           </mc:Choice>
-          <mc:Fallback>
+          <mc:Fallback xmlns="">
             <p:sp>
               <p:nvSpPr>
                 <p:cNvPr id="11" name="TextBox 10">
@@ -5195,8 +6029,8 @@
             </p:sp>
           </mc:Fallback>
         </mc:AlternateContent>
-        <mc:AlternateContent xmlns:mc="http://schemas.openxmlformats.org/markup-compatibility/2006">
-          <mc:Choice xmlns:a14="http://schemas.microsoft.com/office/drawing/2010/main" Requires="a14">
+        <mc:AlternateContent xmlns:mc="http://schemas.openxmlformats.org/markup-compatibility/2006" xmlns:a14="http://schemas.microsoft.com/office/drawing/2010/main">
+          <mc:Choice Requires="a14">
             <p:sp>
               <p:nvSpPr>
                 <p:cNvPr id="12" name="TextBox 11">
@@ -5265,7 +6099,7 @@
               </p:txBody>
             </p:sp>
           </mc:Choice>
-          <mc:Fallback>
+          <mc:Fallback xmlns="">
             <p:sp>
               <p:nvSpPr>
                 <p:cNvPr id="12" name="TextBox 11">
@@ -6138,7 +6972,7 @@
 </p:sld>
 </file>
 
-<file path=ppt/slides/slide3.xml><?xml version="1.0" encoding="utf-8"?>
+<file path=ppt/slides/slide4.xml><?xml version="1.0" encoding="utf-8"?>
 <p:sld xmlns:a="http://schemas.openxmlformats.org/drawingml/2006/main" xmlns:r="http://schemas.openxmlformats.org/officeDocument/2006/relationships" xmlns:p="http://schemas.openxmlformats.org/presentationml/2006/main">
   <p:cSld>
     <p:spTree>
@@ -6181,8 +7015,8 @@
             <a:chExt cx="8003944" cy="3413869"/>
           </a:xfrm>
         </p:grpSpPr>
-        <mc:AlternateContent xmlns:mc="http://schemas.openxmlformats.org/markup-compatibility/2006">
-          <mc:Choice xmlns:a14="http://schemas.microsoft.com/office/drawing/2010/main" Requires="a14">
+        <mc:AlternateContent xmlns:mc="http://schemas.openxmlformats.org/markup-compatibility/2006" xmlns:a14="http://schemas.microsoft.com/office/drawing/2010/main">
+          <mc:Choice Requires="a14">
             <p:sp>
               <p:nvSpPr>
                 <p:cNvPr id="5" name="TextBox 4">
@@ -6211,7 +7045,6 @@
                 </a:bodyPr>
                 <a:lstStyle/>
                 <a:p>
-                  <a:pPr/>
                   <a:r>
                     <a:rPr lang="en-US" b="0" dirty="0"/>
                     <a:t>(</a:t>
@@ -6284,7 +7117,7 @@
               </p:txBody>
             </p:sp>
           </mc:Choice>
-          <mc:Fallback>
+          <mc:Fallback xmlns="">
             <p:sp>
               <p:nvSpPr>
                 <p:cNvPr id="5" name="TextBox 4">
@@ -6520,8 +7353,8 @@
             </a:fontRef>
           </p:style>
         </p:cxnSp>
-        <mc:AlternateContent xmlns:mc="http://schemas.openxmlformats.org/markup-compatibility/2006">
-          <mc:Choice xmlns:a14="http://schemas.microsoft.com/office/drawing/2010/main" Requires="a14">
+        <mc:AlternateContent xmlns:mc="http://schemas.openxmlformats.org/markup-compatibility/2006" xmlns:a14="http://schemas.microsoft.com/office/drawing/2010/main">
+          <mc:Choice Requires="a14">
             <p:sp>
               <p:nvSpPr>
                 <p:cNvPr id="11" name="TextBox 10">
@@ -6571,7 +7404,7 @@
               </p:txBody>
             </p:sp>
           </mc:Choice>
-          <mc:Fallback>
+          <mc:Fallback xmlns="">
             <p:sp>
               <p:nvSpPr>
                 <p:cNvPr id="11" name="TextBox 10">
@@ -6616,8 +7449,8 @@
             </p:sp>
           </mc:Fallback>
         </mc:AlternateContent>
-        <mc:AlternateContent xmlns:mc="http://schemas.openxmlformats.org/markup-compatibility/2006">
-          <mc:Choice xmlns:a14="http://schemas.microsoft.com/office/drawing/2010/main" Requires="a14">
+        <mc:AlternateContent xmlns:mc="http://schemas.openxmlformats.org/markup-compatibility/2006" xmlns:a14="http://schemas.microsoft.com/office/drawing/2010/main">
+          <mc:Choice Requires="a14">
             <p:sp>
               <p:nvSpPr>
                 <p:cNvPr id="12" name="TextBox 11">
@@ -6686,7 +7519,7 @@
               </p:txBody>
             </p:sp>
           </mc:Choice>
-          <mc:Fallback>
+          <mc:Fallback xmlns="">
             <p:sp>
               <p:nvSpPr>
                 <p:cNvPr id="12" name="TextBox 11">
@@ -7418,7 +8251,7 @@
 </p:sld>
 </file>
 
-<file path=ppt/slides/slide4.xml><?xml version="1.0" encoding="utf-8"?>
+<file path=ppt/slides/slide5.xml><?xml version="1.0" encoding="utf-8"?>
 <p:sld xmlns:a="http://schemas.openxmlformats.org/drawingml/2006/main" xmlns:r="http://schemas.openxmlformats.org/officeDocument/2006/relationships" xmlns:p="http://schemas.openxmlformats.org/presentationml/2006/main">
   <p:cSld>
     <p:spTree>
@@ -7461,8 +8294,8 @@
             <a:chExt cx="10563223" cy="2439380"/>
           </a:xfrm>
         </p:grpSpPr>
-        <mc:AlternateContent xmlns:mc="http://schemas.openxmlformats.org/markup-compatibility/2006">
-          <mc:Choice xmlns:a14="http://schemas.microsoft.com/office/drawing/2010/main" Requires="a14">
+        <mc:AlternateContent xmlns:mc="http://schemas.openxmlformats.org/markup-compatibility/2006" xmlns:a14="http://schemas.microsoft.com/office/drawing/2010/main">
+          <mc:Choice Requires="a14">
             <p:sp>
               <p:nvSpPr>
                 <p:cNvPr id="6" name="TextBox 5">
@@ -7491,7 +8324,6 @@
                 </a:bodyPr>
                 <a:lstStyle/>
                 <a:p>
-                  <a:pPr/>
                   <a:r>
                     <a:rPr lang="en-US" b="0" dirty="0"/>
                     <a:t>(</a:t>
@@ -7564,7 +8396,7 @@
               </p:txBody>
             </p:sp>
           </mc:Choice>
-          <mc:Fallback>
+          <mc:Fallback xmlns="">
             <p:sp>
               <p:nvSpPr>
                 <p:cNvPr id="6" name="TextBox 5">
@@ -7717,8 +8549,8 @@
               </a:p>
             </p:txBody>
           </p:sp>
-          <mc:AlternateContent xmlns:mc="http://schemas.openxmlformats.org/markup-compatibility/2006">
-            <mc:Choice xmlns:a14="http://schemas.microsoft.com/office/drawing/2010/main" Requires="a14">
+          <mc:AlternateContent xmlns:mc="http://schemas.openxmlformats.org/markup-compatibility/2006" xmlns:a14="http://schemas.microsoft.com/office/drawing/2010/main">
+            <mc:Choice Requires="a14">
               <p:sp>
                 <p:nvSpPr>
                   <p:cNvPr id="20" name="TextBox 19">
@@ -7787,7 +8619,7 @@
                 </p:txBody>
               </p:sp>
             </mc:Choice>
-            <mc:Fallback>
+            <mc:Fallback xmlns="">
               <p:sp>
                 <p:nvSpPr>
                   <p:cNvPr id="20" name="TextBox 19">
@@ -7998,8 +8830,8 @@
               </a:p>
             </p:txBody>
           </p:sp>
-          <mc:AlternateContent xmlns:mc="http://schemas.openxmlformats.org/markup-compatibility/2006">
-            <mc:Choice xmlns:a14="http://schemas.microsoft.com/office/drawing/2010/main" Requires="a14">
+          <mc:AlternateContent xmlns:mc="http://schemas.openxmlformats.org/markup-compatibility/2006" xmlns:a14="http://schemas.microsoft.com/office/drawing/2010/main">
+            <mc:Choice Requires="a14">
               <p:sp>
                 <p:nvSpPr>
                   <p:cNvPr id="21" name="TextBox 20">
@@ -8068,7 +8900,7 @@
                 </p:txBody>
               </p:sp>
             </mc:Choice>
-            <mc:Fallback>
+            <mc:Fallback xmlns="">
               <p:sp>
                 <p:nvSpPr>
                   <p:cNvPr id="21" name="TextBox 20">
@@ -8114,8 +8946,8 @@
             </mc:Fallback>
           </mc:AlternateContent>
         </p:grpSp>
-        <mc:AlternateContent xmlns:mc="http://schemas.openxmlformats.org/markup-compatibility/2006">
-          <mc:Choice xmlns:a14="http://schemas.microsoft.com/office/drawing/2010/main" Requires="a14">
+        <mc:AlternateContent xmlns:mc="http://schemas.openxmlformats.org/markup-compatibility/2006" xmlns:a14="http://schemas.microsoft.com/office/drawing/2010/main">
+          <mc:Choice Requires="a14">
             <p:sp>
               <p:nvSpPr>
                 <p:cNvPr id="34" name="TextBox 33">
@@ -8144,7 +8976,6 @@
                 </a:bodyPr>
                 <a:lstStyle/>
                 <a:p>
-                  <a:pPr/>
                   <a:r>
                     <a:rPr lang="en-US" b="0" dirty="0"/>
                     <a:t>(</a:t>
@@ -8217,7 +9048,7 @@
               </p:txBody>
             </p:sp>
           </mc:Choice>
-          <mc:Fallback>
+          <mc:Fallback xmlns="">
             <p:sp>
               <p:nvSpPr>
                 <p:cNvPr id="34" name="TextBox 33">
@@ -8427,8 +9258,8 @@
               </a:p>
             </p:txBody>
           </p:sp>
-          <mc:AlternateContent xmlns:mc="http://schemas.openxmlformats.org/markup-compatibility/2006">
-            <mc:Choice xmlns:a14="http://schemas.microsoft.com/office/drawing/2010/main" Requires="a14">
+          <mc:AlternateContent xmlns:mc="http://schemas.openxmlformats.org/markup-compatibility/2006" xmlns:a14="http://schemas.microsoft.com/office/drawing/2010/main">
+            <mc:Choice Requires="a14">
               <p:sp>
                 <p:nvSpPr>
                   <p:cNvPr id="49" name="TextBox 48">
@@ -8497,7 +9328,7 @@
                 </p:txBody>
               </p:sp>
             </mc:Choice>
-            <mc:Fallback>
+            <mc:Fallback xmlns="">
               <p:sp>
                 <p:nvSpPr>
                   <p:cNvPr id="49" name="TextBox 48">
@@ -8543,8 +9374,8 @@
             </mc:Fallback>
           </mc:AlternateContent>
         </p:grpSp>
-        <mc:AlternateContent xmlns:mc="http://schemas.openxmlformats.org/markup-compatibility/2006">
-          <mc:Choice xmlns:a14="http://schemas.microsoft.com/office/drawing/2010/main" Requires="a14">
+        <mc:AlternateContent xmlns:mc="http://schemas.openxmlformats.org/markup-compatibility/2006" xmlns:a14="http://schemas.microsoft.com/office/drawing/2010/main">
+          <mc:Choice Requires="a14">
             <p:sp>
               <p:nvSpPr>
                 <p:cNvPr id="50" name="TextBox 49">
@@ -8573,7 +9404,6 @@
                 </a:bodyPr>
                 <a:lstStyle/>
                 <a:p>
-                  <a:pPr/>
                   <a:r>
                     <a:rPr lang="en-US" b="0" dirty="0"/>
                     <a:t>(</a:t>
@@ -8646,7 +9476,7 @@
               </p:txBody>
             </p:sp>
           </mc:Choice>
-          <mc:Fallback>
+          <mc:Fallback xmlns="">
             <p:sp>
               <p:nvSpPr>
                 <p:cNvPr id="50" name="TextBox 49">
@@ -8856,8 +9686,8 @@
               </a:p>
             </p:txBody>
           </p:sp>
-          <mc:AlternateContent xmlns:mc="http://schemas.openxmlformats.org/markup-compatibility/2006">
-            <mc:Choice xmlns:a14="http://schemas.microsoft.com/office/drawing/2010/main" Requires="a14">
+          <mc:AlternateContent xmlns:mc="http://schemas.openxmlformats.org/markup-compatibility/2006" xmlns:a14="http://schemas.microsoft.com/office/drawing/2010/main">
+            <mc:Choice Requires="a14">
               <p:sp>
                 <p:nvSpPr>
                   <p:cNvPr id="55" name="TextBox 54">
@@ -8926,7 +9756,7 @@
                 </p:txBody>
               </p:sp>
             </mc:Choice>
-            <mc:Fallback>
+            <mc:Fallback xmlns="">
               <p:sp>
                 <p:nvSpPr>
                   <p:cNvPr id="55" name="TextBox 54">
@@ -8972,8 +9802,8 @@
             </mc:Fallback>
           </mc:AlternateContent>
         </p:grpSp>
-        <mc:AlternateContent xmlns:mc="http://schemas.openxmlformats.org/markup-compatibility/2006">
-          <mc:Choice xmlns:a14="http://schemas.microsoft.com/office/drawing/2010/main" Requires="a14">
+        <mc:AlternateContent xmlns:mc="http://schemas.openxmlformats.org/markup-compatibility/2006" xmlns:a14="http://schemas.microsoft.com/office/drawing/2010/main">
+          <mc:Choice Requires="a14">
             <p:sp>
               <p:nvSpPr>
                 <p:cNvPr id="56" name="TextBox 55">
@@ -9002,7 +9832,6 @@
                 </a:bodyPr>
                 <a:lstStyle/>
                 <a:p>
-                  <a:pPr/>
                   <a:r>
                     <a:rPr lang="en-US" b="0" dirty="0"/>
                     <a:t>(</a:t>
@@ -9075,7 +9904,7 @@
               </p:txBody>
             </p:sp>
           </mc:Choice>
-          <mc:Fallback>
+          <mc:Fallback xmlns="">
             <p:sp>
               <p:nvSpPr>
                 <p:cNvPr id="56" name="TextBox 55">
@@ -9285,8 +10114,8 @@
               </a:p>
             </p:txBody>
           </p:sp>
-          <mc:AlternateContent xmlns:mc="http://schemas.openxmlformats.org/markup-compatibility/2006">
-            <mc:Choice xmlns:a14="http://schemas.microsoft.com/office/drawing/2010/main" Requires="a14">
+          <mc:AlternateContent xmlns:mc="http://schemas.openxmlformats.org/markup-compatibility/2006" xmlns:a14="http://schemas.microsoft.com/office/drawing/2010/main">
+            <mc:Choice Requires="a14">
               <p:sp>
                 <p:nvSpPr>
                   <p:cNvPr id="61" name="TextBox 60">
@@ -9355,7 +10184,7 @@
                 </p:txBody>
               </p:sp>
             </mc:Choice>
-            <mc:Fallback>
+            <mc:Fallback xmlns="">
               <p:sp>
                 <p:nvSpPr>
                   <p:cNvPr id="61" name="TextBox 60">
@@ -10140,7 +10969,7 @@
 </p:sld>
 </file>
 
-<file path=ppt/slides/slide5.xml><?xml version="1.0" encoding="utf-8"?>
+<file path=ppt/slides/slide6.xml><?xml version="1.0" encoding="utf-8"?>
 <p:sld xmlns:a="http://schemas.openxmlformats.org/drawingml/2006/main" xmlns:r="http://schemas.openxmlformats.org/officeDocument/2006/relationships" xmlns:p="http://schemas.openxmlformats.org/presentationml/2006/main">
   <p:cSld>
     <p:spTree>
@@ -10183,8 +11012,8 @@
             <a:chExt cx="12490269" cy="2998421"/>
           </a:xfrm>
         </p:grpSpPr>
-        <mc:AlternateContent xmlns:mc="http://schemas.openxmlformats.org/markup-compatibility/2006">
-          <mc:Choice xmlns:a14="http://schemas.microsoft.com/office/drawing/2010/main" Requires="a14">
+        <mc:AlternateContent xmlns:mc="http://schemas.openxmlformats.org/markup-compatibility/2006" xmlns:a14="http://schemas.microsoft.com/office/drawing/2010/main">
+          <mc:Choice Requires="a14">
             <p:sp>
               <p:nvSpPr>
                 <p:cNvPr id="6" name="TextBox 5">
@@ -10213,7 +11042,6 @@
                 </a:bodyPr>
                 <a:lstStyle/>
                 <a:p>
-                  <a:pPr/>
                   <a:r>
                     <a:rPr lang="en-US" b="0" dirty="0"/>
                     <a:t>(</a:t>
@@ -10286,7 +11114,7 @@
               </p:txBody>
             </p:sp>
           </mc:Choice>
-          <mc:Fallback>
+          <mc:Fallback xmlns="">
             <p:sp>
               <p:nvSpPr>
                 <p:cNvPr id="6" name="TextBox 5">
@@ -10404,8 +11232,8 @@
               </a:p>
             </p:txBody>
           </p:sp>
-          <mc:AlternateContent xmlns:mc="http://schemas.openxmlformats.org/markup-compatibility/2006">
-            <mc:Choice xmlns:a14="http://schemas.microsoft.com/office/drawing/2010/main" Requires="a14">
+          <mc:AlternateContent xmlns:mc="http://schemas.openxmlformats.org/markup-compatibility/2006" xmlns:a14="http://schemas.microsoft.com/office/drawing/2010/main">
+            <mc:Choice Requires="a14">
               <p:sp>
                 <p:nvSpPr>
                   <p:cNvPr id="20" name="TextBox 19">
@@ -10474,7 +11302,7 @@
                 </p:txBody>
               </p:sp>
             </mc:Choice>
-            <mc:Fallback>
+            <mc:Fallback xmlns="">
               <p:sp>
                 <p:nvSpPr>
                   <p:cNvPr id="20" name="TextBox 19">
@@ -10685,8 +11513,8 @@
               </a:p>
             </p:txBody>
           </p:sp>
-          <mc:AlternateContent xmlns:mc="http://schemas.openxmlformats.org/markup-compatibility/2006">
-            <mc:Choice xmlns:a14="http://schemas.microsoft.com/office/drawing/2010/main" Requires="a14">
+          <mc:AlternateContent xmlns:mc="http://schemas.openxmlformats.org/markup-compatibility/2006" xmlns:a14="http://schemas.microsoft.com/office/drawing/2010/main">
+            <mc:Choice Requires="a14">
               <p:sp>
                 <p:nvSpPr>
                   <p:cNvPr id="21" name="TextBox 20">
@@ -10755,7 +11583,7 @@
                 </p:txBody>
               </p:sp>
             </mc:Choice>
-            <mc:Fallback>
+            <mc:Fallback xmlns="">
               <p:sp>
                 <p:nvSpPr>
                   <p:cNvPr id="21" name="TextBox 20">
@@ -10801,8 +11629,8 @@
             </mc:Fallback>
           </mc:AlternateContent>
         </p:grpSp>
-        <mc:AlternateContent xmlns:mc="http://schemas.openxmlformats.org/markup-compatibility/2006">
-          <mc:Choice xmlns:a14="http://schemas.microsoft.com/office/drawing/2010/main" Requires="a14">
+        <mc:AlternateContent xmlns:mc="http://schemas.openxmlformats.org/markup-compatibility/2006" xmlns:a14="http://schemas.microsoft.com/office/drawing/2010/main">
+          <mc:Choice Requires="a14">
             <p:sp>
               <p:nvSpPr>
                 <p:cNvPr id="34" name="TextBox 33">
@@ -10831,7 +11659,6 @@
                 </a:bodyPr>
                 <a:lstStyle/>
                 <a:p>
-                  <a:pPr/>
                   <a:r>
                     <a:rPr lang="en-US" b="0" dirty="0"/>
                     <a:t>(</a:t>
@@ -10904,7 +11731,7 @@
               </p:txBody>
             </p:sp>
           </mc:Choice>
-          <mc:Fallback>
+          <mc:Fallback xmlns="">
             <p:sp>
               <p:nvSpPr>
                 <p:cNvPr id="34" name="TextBox 33">
@@ -11114,8 +11941,8 @@
               </a:p>
             </p:txBody>
           </p:sp>
-          <mc:AlternateContent xmlns:mc="http://schemas.openxmlformats.org/markup-compatibility/2006">
-            <mc:Choice xmlns:a14="http://schemas.microsoft.com/office/drawing/2010/main" Requires="a14">
+          <mc:AlternateContent xmlns:mc="http://schemas.openxmlformats.org/markup-compatibility/2006" xmlns:a14="http://schemas.microsoft.com/office/drawing/2010/main">
+            <mc:Choice Requires="a14">
               <p:sp>
                 <p:nvSpPr>
                   <p:cNvPr id="49" name="TextBox 48">
@@ -11184,7 +12011,7 @@
                 </p:txBody>
               </p:sp>
             </mc:Choice>
-            <mc:Fallback>
+            <mc:Fallback xmlns="">
               <p:sp>
                 <p:nvSpPr>
                   <p:cNvPr id="49" name="TextBox 48">
@@ -11230,8 +12057,8 @@
             </mc:Fallback>
           </mc:AlternateContent>
         </p:grpSp>
-        <mc:AlternateContent xmlns:mc="http://schemas.openxmlformats.org/markup-compatibility/2006">
-          <mc:Choice xmlns:a14="http://schemas.microsoft.com/office/drawing/2010/main" Requires="a14">
+        <mc:AlternateContent xmlns:mc="http://schemas.openxmlformats.org/markup-compatibility/2006" xmlns:a14="http://schemas.microsoft.com/office/drawing/2010/main">
+          <mc:Choice Requires="a14">
             <p:sp>
               <p:nvSpPr>
                 <p:cNvPr id="50" name="TextBox 49">
@@ -11260,7 +12087,6 @@
                 </a:bodyPr>
                 <a:lstStyle/>
                 <a:p>
-                  <a:pPr/>
                   <a:r>
                     <a:rPr lang="en-US" b="0" dirty="0"/>
                     <a:t>(</a:t>
@@ -11333,7 +12159,7 @@
               </p:txBody>
             </p:sp>
           </mc:Choice>
-          <mc:Fallback>
+          <mc:Fallback xmlns="">
             <p:sp>
               <p:nvSpPr>
                 <p:cNvPr id="50" name="TextBox 49">
@@ -11543,8 +12369,8 @@
               </a:p>
             </p:txBody>
           </p:sp>
-          <mc:AlternateContent xmlns:mc="http://schemas.openxmlformats.org/markup-compatibility/2006">
-            <mc:Choice xmlns:a14="http://schemas.microsoft.com/office/drawing/2010/main" Requires="a14">
+          <mc:AlternateContent xmlns:mc="http://schemas.openxmlformats.org/markup-compatibility/2006" xmlns:a14="http://schemas.microsoft.com/office/drawing/2010/main">
+            <mc:Choice Requires="a14">
               <p:sp>
                 <p:nvSpPr>
                   <p:cNvPr id="55" name="TextBox 54">
@@ -11613,7 +12439,7 @@
                 </p:txBody>
               </p:sp>
             </mc:Choice>
-            <mc:Fallback>
+            <mc:Fallback xmlns="">
               <p:sp>
                 <p:nvSpPr>
                   <p:cNvPr id="55" name="TextBox 54">
@@ -11659,8 +12485,8 @@
             </mc:Fallback>
           </mc:AlternateContent>
         </p:grpSp>
-        <mc:AlternateContent xmlns:mc="http://schemas.openxmlformats.org/markup-compatibility/2006">
-          <mc:Choice xmlns:a14="http://schemas.microsoft.com/office/drawing/2010/main" Requires="a14">
+        <mc:AlternateContent xmlns:mc="http://schemas.openxmlformats.org/markup-compatibility/2006" xmlns:a14="http://schemas.microsoft.com/office/drawing/2010/main">
+          <mc:Choice Requires="a14">
             <p:sp>
               <p:nvSpPr>
                 <p:cNvPr id="56" name="TextBox 55">
@@ -11689,7 +12515,6 @@
                 </a:bodyPr>
                 <a:lstStyle/>
                 <a:p>
-                  <a:pPr/>
                   <a:r>
                     <a:rPr lang="en-US" b="0" dirty="0"/>
                     <a:t>(</a:t>
@@ -11762,7 +12587,7 @@
               </p:txBody>
             </p:sp>
           </mc:Choice>
-          <mc:Fallback>
+          <mc:Fallback xmlns="">
             <p:sp>
               <p:nvSpPr>
                 <p:cNvPr id="56" name="TextBox 55">
@@ -11972,8 +12797,8 @@
               </a:p>
             </p:txBody>
           </p:sp>
-          <mc:AlternateContent xmlns:mc="http://schemas.openxmlformats.org/markup-compatibility/2006">
-            <mc:Choice xmlns:a14="http://schemas.microsoft.com/office/drawing/2010/main" Requires="a14">
+          <mc:AlternateContent xmlns:mc="http://schemas.openxmlformats.org/markup-compatibility/2006" xmlns:a14="http://schemas.microsoft.com/office/drawing/2010/main">
+            <mc:Choice Requires="a14">
               <p:sp>
                 <p:nvSpPr>
                   <p:cNvPr id="61" name="TextBox 60">
@@ -12042,7 +12867,7 @@
                 </p:txBody>
               </p:sp>
             </mc:Choice>
-            <mc:Fallback>
+            <mc:Fallback xmlns="">
               <p:sp>
                 <p:nvSpPr>
                   <p:cNvPr id="61" name="TextBox 60">
@@ -12674,8 +13499,8 @@
               </a:p>
             </p:txBody>
           </p:sp>
-          <mc:AlternateContent xmlns:mc="http://schemas.openxmlformats.org/markup-compatibility/2006">
-            <mc:Choice xmlns:a14="http://schemas.microsoft.com/office/drawing/2010/main" Requires="a14">
+          <mc:AlternateContent xmlns:mc="http://schemas.openxmlformats.org/markup-compatibility/2006" xmlns:a14="http://schemas.microsoft.com/office/drawing/2010/main">
+            <mc:Choice Requires="a14">
               <p:sp>
                 <p:nvSpPr>
                   <p:cNvPr id="5" name="TextBox 4">
@@ -12744,7 +13569,7 @@
                 </p:txBody>
               </p:sp>
             </mc:Choice>
-            <mc:Fallback>
+            <mc:Fallback xmlns="">
               <p:sp>
                 <p:nvSpPr>
                   <p:cNvPr id="5" name="TextBox 4">
@@ -12912,8 +13737,8 @@
               </a:p>
             </p:txBody>
           </p:sp>
-          <mc:AlternateContent xmlns:mc="http://schemas.openxmlformats.org/markup-compatibility/2006">
-            <mc:Choice xmlns:a14="http://schemas.microsoft.com/office/drawing/2010/main" Requires="a14">
+          <mc:AlternateContent xmlns:mc="http://schemas.openxmlformats.org/markup-compatibility/2006" xmlns:a14="http://schemas.microsoft.com/office/drawing/2010/main">
+            <mc:Choice Requires="a14">
               <p:sp>
                 <p:nvSpPr>
                   <p:cNvPr id="13" name="TextBox 12">
@@ -12982,7 +13807,7 @@
                 </p:txBody>
               </p:sp>
             </mc:Choice>
-            <mc:Fallback>
+            <mc:Fallback xmlns="">
               <p:sp>
                 <p:nvSpPr>
                   <p:cNvPr id="13" name="TextBox 12">
@@ -13196,8 +14021,8 @@
               </a:p>
             </p:txBody>
           </p:sp>
-          <mc:AlternateContent xmlns:mc="http://schemas.openxmlformats.org/markup-compatibility/2006">
-            <mc:Choice xmlns:a14="http://schemas.microsoft.com/office/drawing/2010/main" Requires="a14">
+          <mc:AlternateContent xmlns:mc="http://schemas.openxmlformats.org/markup-compatibility/2006" xmlns:a14="http://schemas.microsoft.com/office/drawing/2010/main">
+            <mc:Choice Requires="a14">
               <p:sp>
                 <p:nvSpPr>
                   <p:cNvPr id="26" name="TextBox 25">
@@ -13266,7 +14091,7 @@
                 </p:txBody>
               </p:sp>
             </mc:Choice>
-            <mc:Fallback>
+            <mc:Fallback xmlns="">
               <p:sp>
                 <p:nvSpPr>
                   <p:cNvPr id="26" name="TextBox 25">
@@ -13312,8 +14137,8 @@
             </mc:Fallback>
           </mc:AlternateContent>
         </p:grpSp>
-        <mc:AlternateContent xmlns:mc="http://schemas.openxmlformats.org/markup-compatibility/2006">
-          <mc:Choice xmlns:a14="http://schemas.microsoft.com/office/drawing/2010/main" Requires="a14">
+        <mc:AlternateContent xmlns:mc="http://schemas.openxmlformats.org/markup-compatibility/2006" xmlns:a14="http://schemas.microsoft.com/office/drawing/2010/main">
+          <mc:Choice Requires="a14">
             <p:sp>
               <p:nvSpPr>
                 <p:cNvPr id="31" name="TextBox 30">
@@ -13342,7 +14167,6 @@
                 </a:bodyPr>
                 <a:lstStyle/>
                 <a:p>
-                  <a:pPr/>
                   <a:r>
                     <a:rPr lang="en-US" b="0" dirty="0"/>
                     <a:t>(</a:t>
@@ -13415,7 +14239,7 @@
               </p:txBody>
             </p:sp>
           </mc:Choice>
-          <mc:Fallback>
+          <mc:Fallback xmlns="">
             <p:sp>
               <p:nvSpPr>
                 <p:cNvPr id="31" name="TextBox 30">
@@ -13506,8 +14330,8 @@
             </a:fontRef>
           </p:style>
         </p:cxnSp>
-        <mc:AlternateContent xmlns:mc="http://schemas.openxmlformats.org/markup-compatibility/2006">
-          <mc:Choice xmlns:a14="http://schemas.microsoft.com/office/drawing/2010/main" Requires="a14">
+        <mc:AlternateContent xmlns:mc="http://schemas.openxmlformats.org/markup-compatibility/2006" xmlns:a14="http://schemas.microsoft.com/office/drawing/2010/main">
+          <mc:Choice Requires="a14">
             <p:sp>
               <p:nvSpPr>
                 <p:cNvPr id="33" name="TextBox 32">
@@ -13536,7 +14360,6 @@
                 </a:bodyPr>
                 <a:lstStyle/>
                 <a:p>
-                  <a:pPr/>
                   <a:r>
                     <a:rPr lang="en-US" b="0" dirty="0"/>
                     <a:t>(</a:t>
@@ -13609,7 +14432,7 @@
               </p:txBody>
             </p:sp>
           </mc:Choice>
-          <mc:Fallback>
+          <mc:Fallback xmlns="">
             <p:sp>
               <p:nvSpPr>
                 <p:cNvPr id="33" name="TextBox 32">
@@ -13700,8 +14523,8 @@
             </a:fontRef>
           </p:style>
         </p:cxnSp>
-        <mc:AlternateContent xmlns:mc="http://schemas.openxmlformats.org/markup-compatibility/2006">
-          <mc:Choice xmlns:a14="http://schemas.microsoft.com/office/drawing/2010/main" Requires="a14">
+        <mc:AlternateContent xmlns:mc="http://schemas.openxmlformats.org/markup-compatibility/2006" xmlns:a14="http://schemas.microsoft.com/office/drawing/2010/main">
+          <mc:Choice Requires="a14">
             <p:sp>
               <p:nvSpPr>
                 <p:cNvPr id="40" name="TextBox 39">
@@ -13730,7 +14553,6 @@
                 </a:bodyPr>
                 <a:lstStyle/>
                 <a:p>
-                  <a:pPr/>
                   <a:r>
                     <a:rPr lang="en-US" b="0" dirty="0"/>
                     <a:t>(</a:t>
@@ -13803,7 +14625,7 @@
               </p:txBody>
             </p:sp>
           </mc:Choice>
-          <mc:Fallback>
+          <mc:Fallback xmlns="">
             <p:sp>
               <p:nvSpPr>
                 <p:cNvPr id="40" name="TextBox 39">
@@ -13935,8 +14757,8 @@
             </a:p>
           </p:txBody>
         </p:sp>
-        <mc:AlternateContent xmlns:mc="http://schemas.openxmlformats.org/markup-compatibility/2006">
-          <mc:Choice xmlns:a14="http://schemas.microsoft.com/office/drawing/2010/main" Requires="a14">
+        <mc:AlternateContent xmlns:mc="http://schemas.openxmlformats.org/markup-compatibility/2006" xmlns:a14="http://schemas.microsoft.com/office/drawing/2010/main">
+          <mc:Choice Requires="a14">
             <p:sp>
               <p:nvSpPr>
                 <p:cNvPr id="159" name="TextBox 158">
@@ -14005,7 +14827,7 @@
               </p:txBody>
             </p:sp>
           </mc:Choice>
-          <mc:Fallback>
+          <mc:Fallback xmlns="">
             <p:sp>
               <p:nvSpPr>
                 <p:cNvPr id="159" name="TextBox 158">
@@ -14050,8 +14872,8 @@
             </p:sp>
           </mc:Fallback>
         </mc:AlternateContent>
-        <mc:AlternateContent xmlns:mc="http://schemas.openxmlformats.org/markup-compatibility/2006">
-          <mc:Choice xmlns:a14="http://schemas.microsoft.com/office/drawing/2010/main" Requires="a14">
+        <mc:AlternateContent xmlns:mc="http://schemas.openxmlformats.org/markup-compatibility/2006" xmlns:a14="http://schemas.microsoft.com/office/drawing/2010/main">
+          <mc:Choice Requires="a14">
             <p:sp>
               <p:nvSpPr>
                 <p:cNvPr id="163" name="TextBox 162">
@@ -14120,7 +14942,7 @@
               </p:txBody>
             </p:sp>
           </mc:Choice>
-          <mc:Fallback>
+          <mc:Fallback xmlns="">
             <p:sp>
               <p:nvSpPr>
                 <p:cNvPr id="163" name="TextBox 162">
@@ -14324,8 +15146,8 @@
             </p:style>
           </p:cxnSp>
         </p:grpSp>
-        <mc:AlternateContent xmlns:mc="http://schemas.openxmlformats.org/markup-compatibility/2006">
-          <mc:Choice xmlns:a14="http://schemas.microsoft.com/office/drawing/2010/main" Requires="a14">
+        <mc:AlternateContent xmlns:mc="http://schemas.openxmlformats.org/markup-compatibility/2006" xmlns:a14="http://schemas.microsoft.com/office/drawing/2010/main">
+          <mc:Choice Requires="a14">
             <p:sp>
               <p:nvSpPr>
                 <p:cNvPr id="165" name="TextBox 164">
@@ -14394,7 +15216,7 @@
               </p:txBody>
             </p:sp>
           </mc:Choice>
-          <mc:Fallback>
+          <mc:Fallback xmlns="">
             <p:sp>
               <p:nvSpPr>
                 <p:cNvPr id="165" name="TextBox 164">
@@ -14820,8 +15642,8 @@
               </a:p>
             </p:txBody>
           </p:sp>
-          <mc:AlternateContent xmlns:mc="http://schemas.openxmlformats.org/markup-compatibility/2006">
-            <mc:Choice xmlns:a14="http://schemas.microsoft.com/office/drawing/2010/main" Requires="a14">
+          <mc:AlternateContent xmlns:mc="http://schemas.openxmlformats.org/markup-compatibility/2006" xmlns:a14="http://schemas.microsoft.com/office/drawing/2010/main">
+            <mc:Choice Requires="a14">
               <p:sp>
                 <p:nvSpPr>
                   <p:cNvPr id="254" name="TextBox 253">
@@ -14890,7 +15712,7 @@
                 </p:txBody>
               </p:sp>
             </mc:Choice>
-            <mc:Fallback>
+            <mc:Fallback xmlns="">
               <p:sp>
                 <p:nvSpPr>
                   <p:cNvPr id="254" name="TextBox 253">
@@ -14996,7 +15818,7 @@
 </p:sld>
 </file>
 
-<file path=ppt/slides/slide6.xml><?xml version="1.0" encoding="utf-8"?>
+<file path=ppt/slides/slide7.xml><?xml version="1.0" encoding="utf-8"?>
 <p:sld xmlns:a="http://schemas.openxmlformats.org/drawingml/2006/main" xmlns:r="http://schemas.openxmlformats.org/officeDocument/2006/relationships" xmlns:p="http://schemas.openxmlformats.org/presentationml/2006/main">
   <p:cSld>
     <p:spTree>
@@ -15133,8 +15955,8 @@
             </a:fontRef>
           </p:style>
         </p:cxnSp>
-        <mc:AlternateContent xmlns:mc="http://schemas.openxmlformats.org/markup-compatibility/2006">
-          <mc:Choice xmlns:a14="http://schemas.microsoft.com/office/drawing/2010/main" Requires="a14">
+        <mc:AlternateContent xmlns:mc="http://schemas.openxmlformats.org/markup-compatibility/2006" xmlns:a14="http://schemas.microsoft.com/office/drawing/2010/main">
+          <mc:Choice Requires="a14">
             <p:sp>
               <p:nvSpPr>
                 <p:cNvPr id="6" name="TextBox 5">
@@ -15163,7 +15985,6 @@
                 </a:bodyPr>
                 <a:lstStyle/>
                 <a:p>
-                  <a:pPr/>
                   <a:r>
                     <a:rPr lang="en-US" b="0" dirty="0"/>
                     <a:t>(</a:t>
@@ -15236,7 +16057,7 @@
               </p:txBody>
             </p:sp>
           </mc:Choice>
-          <mc:Fallback>
+          <mc:Fallback xmlns="">
             <p:sp>
               <p:nvSpPr>
                 <p:cNvPr id="6" name="TextBox 5">
@@ -15354,8 +16175,8 @@
               </a:p>
             </p:txBody>
           </p:sp>
-          <mc:AlternateContent xmlns:mc="http://schemas.openxmlformats.org/markup-compatibility/2006">
-            <mc:Choice xmlns:a14="http://schemas.microsoft.com/office/drawing/2010/main" Requires="a14">
+          <mc:AlternateContent xmlns:mc="http://schemas.openxmlformats.org/markup-compatibility/2006" xmlns:a14="http://schemas.microsoft.com/office/drawing/2010/main">
+            <mc:Choice Requires="a14">
               <p:sp>
                 <p:nvSpPr>
                   <p:cNvPr id="20" name="TextBox 19">
@@ -15424,7 +16245,7 @@
                 </p:txBody>
               </p:sp>
             </mc:Choice>
-            <mc:Fallback>
+            <mc:Fallback xmlns="">
               <p:sp>
                 <p:nvSpPr>
                   <p:cNvPr id="20" name="TextBox 19">
@@ -15635,8 +16456,8 @@
               </a:p>
             </p:txBody>
           </p:sp>
-          <mc:AlternateContent xmlns:mc="http://schemas.openxmlformats.org/markup-compatibility/2006">
-            <mc:Choice xmlns:a14="http://schemas.microsoft.com/office/drawing/2010/main" Requires="a14">
+          <mc:AlternateContent xmlns:mc="http://schemas.openxmlformats.org/markup-compatibility/2006" xmlns:a14="http://schemas.microsoft.com/office/drawing/2010/main">
+            <mc:Choice Requires="a14">
               <p:sp>
                 <p:nvSpPr>
                   <p:cNvPr id="21" name="TextBox 20">
@@ -15705,7 +16526,7 @@
                 </p:txBody>
               </p:sp>
             </mc:Choice>
-            <mc:Fallback>
+            <mc:Fallback xmlns="">
               <p:sp>
                 <p:nvSpPr>
                   <p:cNvPr id="21" name="TextBox 20">
@@ -15751,8 +16572,8 @@
             </mc:Fallback>
           </mc:AlternateContent>
         </p:grpSp>
-        <mc:AlternateContent xmlns:mc="http://schemas.openxmlformats.org/markup-compatibility/2006">
-          <mc:Choice xmlns:a14="http://schemas.microsoft.com/office/drawing/2010/main" Requires="a14">
+        <mc:AlternateContent xmlns:mc="http://schemas.openxmlformats.org/markup-compatibility/2006" xmlns:a14="http://schemas.microsoft.com/office/drawing/2010/main">
+          <mc:Choice Requires="a14">
             <p:sp>
               <p:nvSpPr>
                 <p:cNvPr id="34" name="TextBox 33">
@@ -15781,7 +16602,6 @@
                 </a:bodyPr>
                 <a:lstStyle/>
                 <a:p>
-                  <a:pPr/>
                   <a:r>
                     <a:rPr lang="en-US" b="0" dirty="0"/>
                     <a:t>(</a:t>
@@ -15854,7 +16674,7 @@
               </p:txBody>
             </p:sp>
           </mc:Choice>
-          <mc:Fallback>
+          <mc:Fallback xmlns="">
             <p:sp>
               <p:nvSpPr>
                 <p:cNvPr id="34" name="TextBox 33">
@@ -16064,8 +16884,8 @@
               </a:p>
             </p:txBody>
           </p:sp>
-          <mc:AlternateContent xmlns:mc="http://schemas.openxmlformats.org/markup-compatibility/2006">
-            <mc:Choice xmlns:a14="http://schemas.microsoft.com/office/drawing/2010/main" Requires="a14">
+          <mc:AlternateContent xmlns:mc="http://schemas.openxmlformats.org/markup-compatibility/2006" xmlns:a14="http://schemas.microsoft.com/office/drawing/2010/main">
+            <mc:Choice Requires="a14">
               <p:sp>
                 <p:nvSpPr>
                   <p:cNvPr id="49" name="TextBox 48">
@@ -16134,7 +16954,7 @@
                 </p:txBody>
               </p:sp>
             </mc:Choice>
-            <mc:Fallback>
+            <mc:Fallback xmlns="">
               <p:sp>
                 <p:nvSpPr>
                   <p:cNvPr id="49" name="TextBox 48">
@@ -16180,8 +17000,8 @@
             </mc:Fallback>
           </mc:AlternateContent>
         </p:grpSp>
-        <mc:AlternateContent xmlns:mc="http://schemas.openxmlformats.org/markup-compatibility/2006">
-          <mc:Choice xmlns:a14="http://schemas.microsoft.com/office/drawing/2010/main" Requires="a14">
+        <mc:AlternateContent xmlns:mc="http://schemas.openxmlformats.org/markup-compatibility/2006" xmlns:a14="http://schemas.microsoft.com/office/drawing/2010/main">
+          <mc:Choice Requires="a14">
             <p:sp>
               <p:nvSpPr>
                 <p:cNvPr id="50" name="TextBox 49">
@@ -16210,7 +17030,6 @@
                 </a:bodyPr>
                 <a:lstStyle/>
                 <a:p>
-                  <a:pPr/>
                   <a:r>
                     <a:rPr lang="en-US" b="0" dirty="0"/>
                     <a:t>(</a:t>
@@ -16283,7 +17102,7 @@
               </p:txBody>
             </p:sp>
           </mc:Choice>
-          <mc:Fallback>
+          <mc:Fallback xmlns="">
             <p:sp>
               <p:nvSpPr>
                 <p:cNvPr id="50" name="TextBox 49">
@@ -16493,8 +17312,8 @@
               </a:p>
             </p:txBody>
           </p:sp>
-          <mc:AlternateContent xmlns:mc="http://schemas.openxmlformats.org/markup-compatibility/2006">
-            <mc:Choice xmlns:a14="http://schemas.microsoft.com/office/drawing/2010/main" Requires="a14">
+          <mc:AlternateContent xmlns:mc="http://schemas.openxmlformats.org/markup-compatibility/2006" xmlns:a14="http://schemas.microsoft.com/office/drawing/2010/main">
+            <mc:Choice Requires="a14">
               <p:sp>
                 <p:nvSpPr>
                   <p:cNvPr id="55" name="TextBox 54">
@@ -16563,7 +17382,7 @@
                 </p:txBody>
               </p:sp>
             </mc:Choice>
-            <mc:Fallback>
+            <mc:Fallback xmlns="">
               <p:sp>
                 <p:nvSpPr>
                   <p:cNvPr id="55" name="TextBox 54">
@@ -16609,8 +17428,8 @@
             </mc:Fallback>
           </mc:AlternateContent>
         </p:grpSp>
-        <mc:AlternateContent xmlns:mc="http://schemas.openxmlformats.org/markup-compatibility/2006">
-          <mc:Choice xmlns:a14="http://schemas.microsoft.com/office/drawing/2010/main" Requires="a14">
+        <mc:AlternateContent xmlns:mc="http://schemas.openxmlformats.org/markup-compatibility/2006" xmlns:a14="http://schemas.microsoft.com/office/drawing/2010/main">
+          <mc:Choice Requires="a14">
             <p:sp>
               <p:nvSpPr>
                 <p:cNvPr id="56" name="TextBox 55">
@@ -16639,7 +17458,6 @@
                 </a:bodyPr>
                 <a:lstStyle/>
                 <a:p>
-                  <a:pPr/>
                   <a:r>
                     <a:rPr lang="en-US" b="0" dirty="0"/>
                     <a:t>(</a:t>
@@ -16712,7 +17530,7 @@
               </p:txBody>
             </p:sp>
           </mc:Choice>
-          <mc:Fallback>
+          <mc:Fallback xmlns="">
             <p:sp>
               <p:nvSpPr>
                 <p:cNvPr id="56" name="TextBox 55">
@@ -16922,8 +17740,8 @@
               </a:p>
             </p:txBody>
           </p:sp>
-          <mc:AlternateContent xmlns:mc="http://schemas.openxmlformats.org/markup-compatibility/2006">
-            <mc:Choice xmlns:a14="http://schemas.microsoft.com/office/drawing/2010/main" Requires="a14">
+          <mc:AlternateContent xmlns:mc="http://schemas.openxmlformats.org/markup-compatibility/2006" xmlns:a14="http://schemas.microsoft.com/office/drawing/2010/main">
+            <mc:Choice Requires="a14">
               <p:sp>
                 <p:nvSpPr>
                   <p:cNvPr id="61" name="TextBox 60">
@@ -16992,7 +17810,7 @@
                 </p:txBody>
               </p:sp>
             </mc:Choice>
-            <mc:Fallback>
+            <mc:Fallback xmlns="">
               <p:sp>
                 <p:nvSpPr>
                   <p:cNvPr id="61" name="TextBox 60">
@@ -17624,8 +18442,8 @@
               </a:p>
             </p:txBody>
           </p:sp>
-          <mc:AlternateContent xmlns:mc="http://schemas.openxmlformats.org/markup-compatibility/2006">
-            <mc:Choice xmlns:a14="http://schemas.microsoft.com/office/drawing/2010/main" Requires="a14">
+          <mc:AlternateContent xmlns:mc="http://schemas.openxmlformats.org/markup-compatibility/2006" xmlns:a14="http://schemas.microsoft.com/office/drawing/2010/main">
+            <mc:Choice Requires="a14">
               <p:sp>
                 <p:nvSpPr>
                   <p:cNvPr id="5" name="TextBox 4">
@@ -17694,7 +18512,7 @@
                 </p:txBody>
               </p:sp>
             </mc:Choice>
-            <mc:Fallback>
+            <mc:Fallback xmlns="">
               <p:sp>
                 <p:nvSpPr>
                   <p:cNvPr id="5" name="TextBox 4">
@@ -17862,8 +18680,8 @@
               </a:p>
             </p:txBody>
           </p:sp>
-          <mc:AlternateContent xmlns:mc="http://schemas.openxmlformats.org/markup-compatibility/2006">
-            <mc:Choice xmlns:a14="http://schemas.microsoft.com/office/drawing/2010/main" Requires="a14">
+          <mc:AlternateContent xmlns:mc="http://schemas.openxmlformats.org/markup-compatibility/2006" xmlns:a14="http://schemas.microsoft.com/office/drawing/2010/main">
+            <mc:Choice Requires="a14">
               <p:sp>
                 <p:nvSpPr>
                   <p:cNvPr id="13" name="TextBox 12">
@@ -17932,7 +18750,7 @@
                 </p:txBody>
               </p:sp>
             </mc:Choice>
-            <mc:Fallback>
+            <mc:Fallback xmlns="">
               <p:sp>
                 <p:nvSpPr>
                   <p:cNvPr id="13" name="TextBox 12">
@@ -18146,8 +18964,8 @@
               </a:p>
             </p:txBody>
           </p:sp>
-          <mc:AlternateContent xmlns:mc="http://schemas.openxmlformats.org/markup-compatibility/2006">
-            <mc:Choice xmlns:a14="http://schemas.microsoft.com/office/drawing/2010/main" Requires="a14">
+          <mc:AlternateContent xmlns:mc="http://schemas.openxmlformats.org/markup-compatibility/2006" xmlns:a14="http://schemas.microsoft.com/office/drawing/2010/main">
+            <mc:Choice Requires="a14">
               <p:sp>
                 <p:nvSpPr>
                   <p:cNvPr id="26" name="TextBox 25">
@@ -18216,7 +19034,7 @@
                 </p:txBody>
               </p:sp>
             </mc:Choice>
-            <mc:Fallback>
+            <mc:Fallback xmlns="">
               <p:sp>
                 <p:nvSpPr>
                   <p:cNvPr id="26" name="TextBox 25">
@@ -18262,8 +19080,8 @@
             </mc:Fallback>
           </mc:AlternateContent>
         </p:grpSp>
-        <mc:AlternateContent xmlns:mc="http://schemas.openxmlformats.org/markup-compatibility/2006">
-          <mc:Choice xmlns:a14="http://schemas.microsoft.com/office/drawing/2010/main" Requires="a14">
+        <mc:AlternateContent xmlns:mc="http://schemas.openxmlformats.org/markup-compatibility/2006" xmlns:a14="http://schemas.microsoft.com/office/drawing/2010/main">
+          <mc:Choice Requires="a14">
             <p:sp>
               <p:nvSpPr>
                 <p:cNvPr id="31" name="TextBox 30">
@@ -18292,7 +19110,6 @@
                 </a:bodyPr>
                 <a:lstStyle/>
                 <a:p>
-                  <a:pPr/>
                   <a:r>
                     <a:rPr lang="en-US" b="0" dirty="0"/>
                     <a:t>(</a:t>
@@ -18365,7 +19182,7 @@
               </p:txBody>
             </p:sp>
           </mc:Choice>
-          <mc:Fallback>
+          <mc:Fallback xmlns="">
             <p:sp>
               <p:nvSpPr>
                 <p:cNvPr id="31" name="TextBox 30">
@@ -18589,8 +19406,8 @@
             </a:p>
           </p:txBody>
         </p:sp>
-        <mc:AlternateContent xmlns:mc="http://schemas.openxmlformats.org/markup-compatibility/2006">
-          <mc:Choice xmlns:a14="http://schemas.microsoft.com/office/drawing/2010/main" Requires="a14">
+        <mc:AlternateContent xmlns:mc="http://schemas.openxmlformats.org/markup-compatibility/2006" xmlns:a14="http://schemas.microsoft.com/office/drawing/2010/main">
+          <mc:Choice Requires="a14">
             <p:sp>
               <p:nvSpPr>
                 <p:cNvPr id="159" name="TextBox 158">
@@ -18659,7 +19476,7 @@
               </p:txBody>
             </p:sp>
           </mc:Choice>
-          <mc:Fallback>
+          <mc:Fallback xmlns="">
             <p:sp>
               <p:nvSpPr>
                 <p:cNvPr id="159" name="TextBox 158">
@@ -18704,8 +19521,8 @@
             </p:sp>
           </mc:Fallback>
         </mc:AlternateContent>
-        <mc:AlternateContent xmlns:mc="http://schemas.openxmlformats.org/markup-compatibility/2006">
-          <mc:Choice xmlns:a14="http://schemas.microsoft.com/office/drawing/2010/main" Requires="a14">
+        <mc:AlternateContent xmlns:mc="http://schemas.openxmlformats.org/markup-compatibility/2006" xmlns:a14="http://schemas.microsoft.com/office/drawing/2010/main">
+          <mc:Choice Requires="a14">
             <p:sp>
               <p:nvSpPr>
                 <p:cNvPr id="163" name="TextBox 162">
@@ -18774,7 +19591,7 @@
               </p:txBody>
             </p:sp>
           </mc:Choice>
-          <mc:Fallback>
+          <mc:Fallback xmlns="">
             <p:sp>
               <p:nvSpPr>
                 <p:cNvPr id="163" name="TextBox 162">
@@ -18978,8 +19795,8 @@
             </p:style>
           </p:cxnSp>
         </p:grpSp>
-        <mc:AlternateContent xmlns:mc="http://schemas.openxmlformats.org/markup-compatibility/2006">
-          <mc:Choice xmlns:a14="http://schemas.microsoft.com/office/drawing/2010/main" Requires="a14">
+        <mc:AlternateContent xmlns:mc="http://schemas.openxmlformats.org/markup-compatibility/2006" xmlns:a14="http://schemas.microsoft.com/office/drawing/2010/main">
+          <mc:Choice Requires="a14">
             <p:sp>
               <p:nvSpPr>
                 <p:cNvPr id="165" name="TextBox 164">
@@ -19048,7 +19865,7 @@
               </p:txBody>
             </p:sp>
           </mc:Choice>
-          <mc:Fallback>
+          <mc:Fallback xmlns="">
             <p:sp>
               <p:nvSpPr>
                 <p:cNvPr id="165" name="TextBox 164">
@@ -19398,8 +20215,8 @@
             </a:p>
           </p:txBody>
         </p:sp>
-        <mc:AlternateContent xmlns:mc="http://schemas.openxmlformats.org/markup-compatibility/2006">
-          <mc:Choice xmlns:a14="http://schemas.microsoft.com/office/drawing/2010/main" Requires="a14">
+        <mc:AlternateContent xmlns:mc="http://schemas.openxmlformats.org/markup-compatibility/2006" xmlns:a14="http://schemas.microsoft.com/office/drawing/2010/main">
+          <mc:Choice Requires="a14">
             <p:sp>
               <p:nvSpPr>
                 <p:cNvPr id="15" name="TextBox 14">
@@ -19468,7 +20285,7 @@
               </p:txBody>
             </p:sp>
           </mc:Choice>
-          <mc:Fallback>
+          <mc:Fallback xmlns="">
             <p:sp>
               <p:nvSpPr>
                 <p:cNvPr id="15" name="TextBox 14">
@@ -19589,8 +20406,8 @@
               </a:p>
             </p:txBody>
           </p:sp>
-          <mc:AlternateContent xmlns:mc="http://schemas.openxmlformats.org/markup-compatibility/2006">
-            <mc:Choice xmlns:a14="http://schemas.microsoft.com/office/drawing/2010/main" Requires="a14">
+          <mc:AlternateContent xmlns:mc="http://schemas.openxmlformats.org/markup-compatibility/2006" xmlns:a14="http://schemas.microsoft.com/office/drawing/2010/main">
+            <mc:Choice Requires="a14">
               <p:sp>
                 <p:nvSpPr>
                   <p:cNvPr id="29" name="TextBox 28">
@@ -19659,7 +20476,7 @@
                 </p:txBody>
               </p:sp>
             </mc:Choice>
-            <mc:Fallback>
+            <mc:Fallback xmlns="">
               <p:sp>
                 <p:nvSpPr>
                   <p:cNvPr id="29" name="TextBox 28">
@@ -19751,8 +20568,8 @@
             </a:fontRef>
           </p:style>
         </p:cxnSp>
-        <mc:AlternateContent xmlns:mc="http://schemas.openxmlformats.org/markup-compatibility/2006">
-          <mc:Choice xmlns:a14="http://schemas.microsoft.com/office/drawing/2010/main" Requires="a14">
+        <mc:AlternateContent xmlns:mc="http://schemas.openxmlformats.org/markup-compatibility/2006" xmlns:a14="http://schemas.microsoft.com/office/drawing/2010/main">
+          <mc:Choice Requires="a14">
             <p:sp>
               <p:nvSpPr>
                 <p:cNvPr id="38" name="TextBox 37">
@@ -19821,7 +20638,7 @@
               </p:txBody>
             </p:sp>
           </mc:Choice>
-          <mc:Fallback>
+          <mc:Fallback xmlns="">
             <p:sp>
               <p:nvSpPr>
                 <p:cNvPr id="38" name="TextBox 37">
@@ -19998,7 +20815,7 @@
 </p:sld>
 </file>
 
-<file path=ppt/slides/slide7.xml><?xml version="1.0" encoding="utf-8"?>
+<file path=ppt/slides/slide8.xml><?xml version="1.0" encoding="utf-8"?>
 <p:sld xmlns:a="http://schemas.openxmlformats.org/drawingml/2006/main" xmlns:r="http://schemas.openxmlformats.org/officeDocument/2006/relationships" xmlns:p="http://schemas.openxmlformats.org/presentationml/2006/main">
   <p:cSld>
     <p:spTree>
@@ -20041,8 +20858,8 @@
             <a:chExt cx="6698074" cy="3194807"/>
           </a:xfrm>
         </p:grpSpPr>
-        <mc:AlternateContent xmlns:mc="http://schemas.openxmlformats.org/markup-compatibility/2006">
-          <mc:Choice xmlns:a14="http://schemas.microsoft.com/office/drawing/2010/main" Requires="a14">
+        <mc:AlternateContent xmlns:mc="http://schemas.openxmlformats.org/markup-compatibility/2006" xmlns:a14="http://schemas.microsoft.com/office/drawing/2010/main">
+          <mc:Choice Requires="a14">
             <p:sp>
               <p:nvSpPr>
                 <p:cNvPr id="25" name="TextBox 24">
@@ -20071,7 +20888,6 @@
                 </a:bodyPr>
                 <a:lstStyle/>
                 <a:p>
-                  <a:pPr/>
                   <a:r>
                     <a:rPr lang="en-US" b="0" dirty="0"/>
                     <a:t>(</a:t>
@@ -20144,7 +20960,7 @@
               </p:txBody>
             </p:sp>
           </mc:Choice>
-          <mc:Fallback>
+          <mc:Fallback xmlns="">
             <p:sp>
               <p:nvSpPr>
                 <p:cNvPr id="25" name="TextBox 24">
@@ -20424,8 +21240,8 @@
             </a:fontRef>
           </p:style>
         </p:cxnSp>
-        <mc:AlternateContent xmlns:mc="http://schemas.openxmlformats.org/markup-compatibility/2006">
-          <mc:Choice xmlns:a14="http://schemas.microsoft.com/office/drawing/2010/main" Requires="a14">
+        <mc:AlternateContent xmlns:mc="http://schemas.openxmlformats.org/markup-compatibility/2006" xmlns:a14="http://schemas.microsoft.com/office/drawing/2010/main">
+          <mc:Choice Requires="a14">
             <p:sp>
               <p:nvSpPr>
                 <p:cNvPr id="31" name="TextBox 30">
@@ -20475,7 +21291,7 @@
               </p:txBody>
             </p:sp>
           </mc:Choice>
-          <mc:Fallback>
+          <mc:Fallback xmlns="">
             <p:sp>
               <p:nvSpPr>
                 <p:cNvPr id="31" name="TextBox 30">
@@ -20520,8 +21336,8 @@
             </p:sp>
           </mc:Fallback>
         </mc:AlternateContent>
-        <mc:AlternateContent xmlns:mc="http://schemas.openxmlformats.org/markup-compatibility/2006">
-          <mc:Choice xmlns:a14="http://schemas.microsoft.com/office/drawing/2010/main" Requires="a14">
+        <mc:AlternateContent xmlns:mc="http://schemas.openxmlformats.org/markup-compatibility/2006" xmlns:a14="http://schemas.microsoft.com/office/drawing/2010/main">
+          <mc:Choice Requires="a14">
             <p:sp>
               <p:nvSpPr>
                 <p:cNvPr id="32" name="TextBox 31">
@@ -20590,7 +21406,7 @@
               </p:txBody>
             </p:sp>
           </mc:Choice>
-          <mc:Fallback>
+          <mc:Fallback xmlns="">
             <p:sp>
               <p:nvSpPr>
                 <p:cNvPr id="32" name="TextBox 31">
@@ -20635,8 +21451,8 @@
             </p:sp>
           </mc:Fallback>
         </mc:AlternateContent>
-        <mc:AlternateContent xmlns:mc="http://schemas.openxmlformats.org/markup-compatibility/2006">
-          <mc:Choice xmlns:a14="http://schemas.microsoft.com/office/drawing/2010/main" Requires="a14">
+        <mc:AlternateContent xmlns:mc="http://schemas.openxmlformats.org/markup-compatibility/2006" xmlns:a14="http://schemas.microsoft.com/office/drawing/2010/main">
+          <mc:Choice Requires="a14">
             <p:sp>
               <p:nvSpPr>
                 <p:cNvPr id="33" name="TextBox 32">
@@ -20689,7 +21505,7 @@
               </p:txBody>
             </p:sp>
           </mc:Choice>
-          <mc:Fallback>
+          <mc:Fallback xmlns="">
             <p:sp>
               <p:nvSpPr>
                 <p:cNvPr id="33" name="TextBox 32">

</xml_diff>